<commit_message>
Updates to Powerpoint, Google Social Login Details
</commit_message>
<xml_diff>
--- a/Keycloak ConfigurationsTest.pptx
+++ b/Keycloak ConfigurationsTest.pptx
@@ -7,19 +7,18 @@
   <p:sldIdLst>
     <p:sldId id="343" r:id="rId2"/>
     <p:sldId id="351" r:id="rId3"/>
-    <p:sldId id="353" r:id="rId4"/>
-    <p:sldId id="352" r:id="rId5"/>
-    <p:sldId id="354" r:id="rId6"/>
-    <p:sldId id="355" r:id="rId7"/>
-    <p:sldId id="363" r:id="rId8"/>
-    <p:sldId id="356" r:id="rId9"/>
-    <p:sldId id="358" r:id="rId10"/>
-    <p:sldId id="357" r:id="rId11"/>
-    <p:sldId id="359" r:id="rId12"/>
-    <p:sldId id="364" r:id="rId13"/>
-    <p:sldId id="360" r:id="rId14"/>
-    <p:sldId id="361" r:id="rId15"/>
-    <p:sldId id="362" r:id="rId16"/>
+    <p:sldId id="352" r:id="rId4"/>
+    <p:sldId id="354" r:id="rId5"/>
+    <p:sldId id="355" r:id="rId6"/>
+    <p:sldId id="363" r:id="rId7"/>
+    <p:sldId id="356" r:id="rId8"/>
+    <p:sldId id="358" r:id="rId9"/>
+    <p:sldId id="357" r:id="rId10"/>
+    <p:sldId id="359" r:id="rId11"/>
+    <p:sldId id="364" r:id="rId12"/>
+    <p:sldId id="360" r:id="rId13"/>
+    <p:sldId id="361" r:id="rId14"/>
+    <p:sldId id="362" r:id="rId15"/>
   </p:sldIdLst>
   <p:sldSz cx="12192000" cy="6858000"/>
   <p:notesSz cx="6858000" cy="9144000"/>
@@ -391,7 +390,7 @@
           <a:p>
             <a:fld id="{9184DA70-C731-4C70-880D-CCD4705E623C}" type="datetime1">
               <a:rPr lang="en-US" noProof="0" smtClean="0"/>
-              <a:t>3/2/2021</a:t>
+              <a:t>3/16/2021</a:t>
             </a:fld>
             <a:endParaRPr lang="en-US" noProof="0" dirty="0"/>
           </a:p>
@@ -512,7 +511,7 @@
           <a:p>
             <a:fld id="{39667345-2558-425A-8533-9BFDBCE15005}" type="datetime1">
               <a:rPr lang="en-US" noProof="0" smtClean="0"/>
-              <a:t>3/2/2021</a:t>
+              <a:t>3/16/2021</a:t>
             </a:fld>
             <a:endParaRPr lang="en-US" noProof="0" dirty="0"/>
           </a:p>
@@ -900,7 +899,7 @@
           <a:p>
             <a:fld id="{39667345-2558-425A-8533-9BFDBCE15005}" type="datetime1">
               <a:rPr lang="en-US" noProof="0" smtClean="0"/>
-              <a:t>3/2/2021</a:t>
+              <a:t>3/16/2021</a:t>
             </a:fld>
             <a:endParaRPr lang="en-US" noProof="0" dirty="0"/>
           </a:p>
@@ -1735,7 +1734,7 @@
           <a:p>
             <a:fld id="{4907D986-8816-4272-A432-0437A28A9828}" type="datetime1">
               <a:rPr lang="en-US" noProof="0" smtClean="0"/>
-              <a:t>3/2/2021</a:t>
+              <a:t>3/16/2021</a:t>
             </a:fld>
             <a:endParaRPr lang="en-US" noProof="0" dirty="0"/>
           </a:p>
@@ -2067,7 +2066,7 @@
           <a:p>
             <a:fld id="{9184DA70-C731-4C70-880D-CCD4705E623C}" type="datetime1">
               <a:rPr lang="en-US" noProof="0" smtClean="0"/>
-              <a:t>3/2/2021</a:t>
+              <a:t>3/16/2021</a:t>
             </a:fld>
             <a:endParaRPr lang="en-US" noProof="0" dirty="0"/>
           </a:p>
@@ -2375,7 +2374,7 @@
           <a:p>
             <a:fld id="{4BE1D723-8F53-4F53-90B0-1982A396982E}" type="datetime1">
               <a:rPr lang="en-US" noProof="0" smtClean="0"/>
-              <a:t>3/2/2021</a:t>
+              <a:t>3/16/2021</a:t>
             </a:fld>
             <a:endParaRPr lang="en-US" noProof="0" dirty="0"/>
           </a:p>
@@ -2968,7 +2967,7 @@
           <a:p>
             <a:fld id="{D9DF0F1C-5577-4ACB-BB62-DF8F3C494C7E}" type="datetime1">
               <a:rPr lang="en-US" noProof="0" smtClean="0"/>
-              <a:t>3/2/2021</a:t>
+              <a:t>3/16/2021</a:t>
             </a:fld>
             <a:endParaRPr lang="en-US" noProof="0" dirty="0"/>
           </a:p>
@@ -3231,7 +3230,7 @@
           <a:p>
             <a:fld id="{1775B394-D9F9-4F0C-B15D-605F45CB9E9F}" type="datetime1">
               <a:rPr lang="en-US" noProof="0" smtClean="0"/>
-              <a:t>3/2/2021</a:t>
+              <a:t>3/16/2021</a:t>
             </a:fld>
             <a:endParaRPr lang="en-US" noProof="0" dirty="0"/>
           </a:p>
@@ -3494,7 +3493,7 @@
           <a:p>
             <a:fld id="{1775B394-D9F9-4F0C-B15D-605F45CB9E9F}" type="datetime1">
               <a:rPr lang="en-US" noProof="0" smtClean="0"/>
-              <a:t>3/2/2021</a:t>
+              <a:t>3/16/2021</a:t>
             </a:fld>
             <a:endParaRPr lang="en-US" noProof="0" dirty="0"/>
           </a:p>
@@ -4011,7 +4010,7 @@
           <a:p>
             <a:fld id="{39667345-2558-425A-8533-9BFDBCE15005}" type="datetime1">
               <a:rPr lang="en-US" noProof="0" smtClean="0"/>
-              <a:t>3/2/2021</a:t>
+              <a:t>3/16/2021</a:t>
             </a:fld>
             <a:endParaRPr lang="en-US" noProof="0" dirty="0"/>
           </a:p>
@@ -4132,7 +4131,7 @@
           <a:p>
             <a:fld id="{39667345-2558-425A-8533-9BFDBCE15005}" type="datetime1">
               <a:rPr lang="en-US" noProof="0" smtClean="0"/>
-              <a:t>3/2/2021</a:t>
+              <a:t>3/16/2021</a:t>
             </a:fld>
             <a:endParaRPr lang="en-US" noProof="0" dirty="0"/>
           </a:p>
@@ -4564,7 +4563,7 @@
           <a:p>
             <a:fld id="{39667345-2558-425A-8533-9BFDBCE15005}" type="datetime1">
               <a:rPr lang="en-US" noProof="0" smtClean="0"/>
-              <a:t>3/2/2021</a:t>
+              <a:t>3/16/2021</a:t>
             </a:fld>
             <a:endParaRPr lang="en-US" noProof="0" dirty="0"/>
           </a:p>
@@ -5106,7 +5105,7 @@
           <a:p>
             <a:fld id="{62D6E202-B606-4609-B914-27C9371A1F6D}" type="datetime1">
               <a:rPr lang="en-US" noProof="0" smtClean="0"/>
-              <a:t>3/2/2021</a:t>
+              <a:t>3/16/2021</a:t>
             </a:fld>
             <a:endParaRPr lang="en-US" noProof="0" dirty="0"/>
           </a:p>
@@ -5700,7 +5699,7 @@
           <a:p>
             <a:r>
               <a:rPr lang="en-US" dirty="0"/>
-              <a:t>Create clients</a:t>
+              <a:t>Testing for an app – new client</a:t>
             </a:r>
           </a:p>
         </p:txBody>
@@ -5733,22 +5732,19 @@
           </a:bodyPr>
           <a:lstStyle/>
           <a:p>
-            <a:pPr>
+            <a:pPr lvl="1">
               <a:buClr>
                 <a:schemeClr val="tx1"/>
               </a:buClr>
               <a:buFont typeface="Arial" panose="020B0604020202020204" pitchFamily="34" charset="0"/>
               <a:buChar char="•"/>
             </a:pPr>
-            <a:r>
-              <a:rPr lang="en-US" dirty="0">
-                <a:latin typeface="Open Sans"/>
-              </a:rPr>
-              <a:t>Client Id: vanilla</a:t>
-            </a:r>
-          </a:p>
-          <a:p>
-            <a:pPr>
+            <a:endParaRPr lang="en-US" dirty="0">
+              <a:latin typeface="Open Sans"/>
+            </a:endParaRPr>
+          </a:p>
+          <a:p>
+            <a:pPr lvl="1">
               <a:buClr>
                 <a:schemeClr val="tx1"/>
               </a:buClr>
@@ -5760,31 +5756,22 @@
                 <a:effectLst/>
                 <a:latin typeface="Open Sans"/>
               </a:rPr>
-              <a:t>Client Protocol: </a:t>
+              <a:t>Client Id: </a:t>
             </a:r>
             <a:r>
               <a:rPr lang="en-US" b="0" i="0" u="none" strike="noStrike" dirty="0" err="1">
                 <a:effectLst/>
                 <a:latin typeface="Open Sans"/>
               </a:rPr>
-              <a:t>openid</a:t>
-            </a:r>
-            <a:r>
-              <a:rPr lang="en-US" b="0" i="0" u="none" strike="noStrike" dirty="0">
-                <a:effectLst/>
-                <a:latin typeface="Open Sans"/>
-              </a:rPr>
-              <a:t>-co</a:t>
-            </a:r>
-            <a:r>
-              <a:rPr lang="en-US" dirty="0">
-                <a:latin typeface="Open Sans"/>
-              </a:rPr>
-              <a:t>nnect</a:t>
-            </a:r>
-          </a:p>
-          <a:p>
-            <a:pPr>
+              <a:t>Testapp</a:t>
+            </a:r>
+            <a:endParaRPr lang="en-US" b="0" i="0" u="none" strike="noStrike" dirty="0">
+              <a:effectLst/>
+              <a:latin typeface="Open Sans"/>
+            </a:endParaRPr>
+          </a:p>
+          <a:p>
+            <a:pPr lvl="1">
               <a:buClr>
                 <a:schemeClr val="tx1"/>
               </a:buClr>
@@ -5792,27 +5779,26 @@
               <a:buChar char="•"/>
             </a:pPr>
             <a:r>
-              <a:rPr lang="en-US" b="0" i="0" u="none" strike="noStrike" dirty="0">
-                <a:effectLst/>
+              <a:rPr lang="en-US" dirty="0">
                 <a:latin typeface="Open Sans"/>
               </a:rPr>
-              <a:t>Root URL: </a:t>
-            </a:r>
-            <a:r>
-              <a:rPr lang="en-US" b="0" i="0" u="none" strike="noStrike" dirty="0">
-                <a:effectLst/>
+              <a:t>Client Protocol: </a:t>
+            </a:r>
+            <a:r>
+              <a:rPr lang="en-US" dirty="0" err="1">
                 <a:latin typeface="Open Sans"/>
-                <a:hlinkClick r:id="rId2"/>
-              </a:rPr>
-              <a:t>http://localhost:8080/vanilla</a:t>
-            </a:r>
-            <a:endParaRPr lang="en-US" b="0" i="0" u="none" strike="noStrike" dirty="0">
-              <a:effectLst/>
-              <a:latin typeface="Open Sans"/>
-            </a:endParaRPr>
-          </a:p>
-          <a:p>
-            <a:pPr>
+              </a:rPr>
+              <a:t>openid</a:t>
+            </a:r>
+            <a:r>
+              <a:rPr lang="en-US" dirty="0">
+                <a:latin typeface="Open Sans"/>
+              </a:rPr>
+              <a:t>-connect</a:t>
+            </a:r>
+          </a:p>
+          <a:p>
+            <a:pPr lvl="1">
               <a:buClr>
                 <a:schemeClr val="tx1"/>
               </a:buClr>
@@ -5820,92 +5806,27 @@
               <a:buChar char="•"/>
             </a:pPr>
             <a:r>
-              <a:rPr lang="en-US" dirty="0">
+              <a:rPr lang="en-US" b="0" i="0" u="none" strike="noStrike" dirty="0">
+                <a:effectLst/>
                 <a:latin typeface="Open Sans"/>
               </a:rPr>
-              <a:t>Save and click on ‘Installation Tab’</a:t>
-            </a:r>
-          </a:p>
-          <a:p>
-            <a:pPr>
-              <a:buClr>
-                <a:schemeClr val="tx1"/>
-              </a:buClr>
-              <a:buFont typeface="Arial" panose="020B0604020202020204" pitchFamily="34" charset="0"/>
-              <a:buChar char="•"/>
-            </a:pPr>
+              <a:t>Root Url: </a:t>
+            </a:r>
             <a:r>
               <a:rPr lang="en-US" b="0" i="0" u="none" strike="noStrike" dirty="0">
                 <a:effectLst/>
                 <a:latin typeface="Open Sans"/>
-              </a:rPr>
-              <a:t>Select </a:t>
-            </a:r>
-            <a:r>
-              <a:rPr lang="en-US" dirty="0">
-                <a:latin typeface="Open Sans"/>
-              </a:rPr>
-              <a:t>‘</a:t>
-            </a:r>
-            <a:r>
-              <a:rPr lang="en-US" dirty="0" err="1">
-                <a:latin typeface="Open Sans"/>
-              </a:rPr>
-              <a:t>Keycloak</a:t>
-            </a:r>
-            <a:r>
-              <a:rPr lang="en-US" dirty="0">
-                <a:latin typeface="Open Sans"/>
-              </a:rPr>
-              <a:t> OIDC JSON’ and download and save to main Directory</a:t>
-            </a:r>
-          </a:p>
-          <a:p>
-            <a:pPr>
-              <a:buClr>
-                <a:schemeClr val="tx1"/>
-              </a:buClr>
-              <a:buFont typeface="Arial" panose="020B0604020202020204" pitchFamily="34" charset="0"/>
-              <a:buChar char="•"/>
-            </a:pPr>
-            <a:r>
-              <a:rPr lang="en-US" b="0" i="0" u="none" strike="noStrike" dirty="0">
-                <a:effectLst/>
-                <a:latin typeface="Open Sans"/>
-              </a:rPr>
-              <a:t>Repeat last step for ‘</a:t>
-            </a:r>
-            <a:r>
-              <a:rPr lang="en-US" b="0" i="0" u="none" strike="noStrike" dirty="0" err="1">
-                <a:effectLst/>
-                <a:latin typeface="Open Sans"/>
-              </a:rPr>
-              <a:t>Keycloak</a:t>
-            </a:r>
-            <a:r>
-              <a:rPr lang="en-US" b="0" i="0" u="none" strike="noStrike" dirty="0">
-                <a:effectLst/>
-                <a:latin typeface="Open Sans"/>
-              </a:rPr>
-              <a:t> OIDC </a:t>
-            </a:r>
-            <a:r>
-              <a:rPr lang="en-US" b="0" i="0" u="none" strike="noStrike" dirty="0" err="1">
-                <a:effectLst/>
-                <a:latin typeface="Open Sans"/>
-              </a:rPr>
-              <a:t>Jboss</a:t>
-            </a:r>
-            <a:r>
-              <a:rPr lang="en-US" b="0" i="0" u="none" strike="noStrike" dirty="0">
-                <a:effectLst/>
-                <a:latin typeface="Open Sans"/>
-              </a:rPr>
-              <a:t> Subsystem XML’</a:t>
-            </a:r>
-          </a:p>
-          <a:p>
-            <a:pPr>
+                <a:hlinkClick r:id="rId2"/>
+              </a:rPr>
+              <a:t>http://localhost:8180/Testapp</a:t>
+            </a:r>
+            <a:endParaRPr lang="en-US" b="0" i="0" u="none" strike="noStrike" dirty="0">
+              <a:effectLst/>
+              <a:latin typeface="Open Sans"/>
+            </a:endParaRPr>
+          </a:p>
+          <a:p>
+            <a:pPr lvl="1">
               <a:buClr>
                 <a:schemeClr val="tx1"/>
               </a:buClr>
@@ -6296,7 +6217,7 @@
     </p:spTree>
     <p:extLst>
       <p:ext uri="{BB962C8B-B14F-4D97-AF65-F5344CB8AC3E}">
-        <p14:creationId xmlns:p14="http://schemas.microsoft.com/office/powerpoint/2010/main" val="1732233413"/>
+        <p14:creationId xmlns:p14="http://schemas.microsoft.com/office/powerpoint/2010/main" val="2540365031"/>
       </p:ext>
     </p:extLst>
   </p:cSld>
@@ -6351,7 +6272,7 @@
           <a:p>
             <a:r>
               <a:rPr lang="en-US" dirty="0"/>
-              <a:t>Testing for an app – new client</a:t>
+              <a:t>IDENTITY PROVIDERS: SOCIAL LOGINS</a:t>
             </a:r>
           </a:p>
         </p:txBody>
@@ -6384,6 +6305,25 @@
           </a:bodyPr>
           <a:lstStyle/>
           <a:p>
+            <a:pPr>
+              <a:buClr>
+                <a:schemeClr val="tx1"/>
+              </a:buClr>
+              <a:buFont typeface="Arial" panose="020B0604020202020204" pitchFamily="34" charset="0"/>
+              <a:buChar char="•"/>
+            </a:pPr>
+            <a:r>
+              <a:rPr lang="en-US" dirty="0">
+                <a:latin typeface="Open Sans"/>
+              </a:rPr>
+              <a:t>Created Google App</a:t>
+            </a:r>
+            <a:endParaRPr lang="en-US" b="0" i="0" u="none" strike="noStrike" dirty="0">
+              <a:effectLst/>
+              <a:latin typeface="Open Sans"/>
+            </a:endParaRPr>
+          </a:p>
+          <a:p>
             <a:pPr lvl="1">
               <a:buClr>
                 <a:schemeClr val="tx1"/>
@@ -6391,9 +6331,12 @@
               <a:buFont typeface="Arial" panose="020B0604020202020204" pitchFamily="34" charset="0"/>
               <a:buChar char="•"/>
             </a:pPr>
-            <a:endParaRPr lang="en-US" dirty="0">
-              <a:latin typeface="Open Sans"/>
-            </a:endParaRPr>
+            <a:r>
+              <a:rPr lang="en-US" dirty="0">
+                <a:latin typeface="Open Sans"/>
+              </a:rPr>
+              <a:t>eolatunde@highstep.com</a:t>
+            </a:r>
           </a:p>
           <a:p>
             <a:pPr lvl="1">
@@ -6404,23 +6347,33 @@
               <a:buChar char="•"/>
             </a:pPr>
             <a:r>
+              <a:rPr lang="en-US" b="0" i="0" u="none" strike="noStrike" dirty="0" err="1">
+                <a:effectLst/>
+                <a:latin typeface="Open Sans"/>
+              </a:rPr>
+              <a:t>Oauth</a:t>
+            </a:r>
+            <a:r>
               <a:rPr lang="en-US" b="0" i="0" u="none" strike="noStrike" dirty="0">
                 <a:effectLst/>
                 <a:latin typeface="Open Sans"/>
               </a:rPr>
-              <a:t>Client Id: </a:t>
+              <a:t> </a:t>
             </a:r>
             <a:r>
               <a:rPr lang="en-US" b="0" i="0" u="none" strike="noStrike" dirty="0" err="1">
                 <a:effectLst/>
                 <a:latin typeface="Open Sans"/>
               </a:rPr>
-              <a:t>Testapp</a:t>
-            </a:r>
-            <a:endParaRPr lang="en-US" b="0" i="0" u="none" strike="noStrike" dirty="0">
-              <a:effectLst/>
-              <a:latin typeface="Open Sans"/>
-            </a:endParaRPr>
+              <a:t>concent</a:t>
+            </a:r>
+            <a:r>
+              <a:rPr lang="en-US" b="0" i="0" u="none" strike="noStrike" dirty="0">
+                <a:effectLst/>
+                <a:latin typeface="Open Sans"/>
+              </a:rPr>
+              <a:t> App</a:t>
+            </a:r>
           </a:p>
           <a:p>
             <a:pPr lvl="1">
@@ -6434,19 +6387,19 @@
               <a:rPr lang="en-US" dirty="0">
                 <a:latin typeface="Open Sans"/>
               </a:rPr>
-              <a:t>Client Protocol: </a:t>
+              <a:t>Name: my-</a:t>
             </a:r>
             <a:r>
               <a:rPr lang="en-US" dirty="0" err="1">
                 <a:latin typeface="Open Sans"/>
               </a:rPr>
-              <a:t>openid</a:t>
+              <a:t>keyclaok</a:t>
             </a:r>
             <a:r>
               <a:rPr lang="en-US" dirty="0">
                 <a:latin typeface="Open Sans"/>
               </a:rPr>
-              <a:t>-connect</a:t>
+              <a:t>-app</a:t>
             </a:r>
           </a:p>
           <a:p>
@@ -6462,15 +6415,72 @@
                 <a:effectLst/>
                 <a:latin typeface="Open Sans"/>
               </a:rPr>
-              <a:t>Root Url: </a:t>
-            </a:r>
+              <a:t>Authori</a:t>
+            </a:r>
+            <a:r>
+              <a:rPr lang="en-US" dirty="0">
+                <a:latin typeface="Open Sans"/>
+              </a:rPr>
+              <a:t>zed users</a:t>
+            </a:r>
+          </a:p>
+          <a:p>
+            <a:pPr lvl="2">
+              <a:buClr>
+                <a:schemeClr val="tx1"/>
+              </a:buClr>
+              <a:buFont typeface="Arial" panose="020B0604020202020204" pitchFamily="34" charset="0"/>
+              <a:buChar char="•"/>
+            </a:pPr>
             <a:r>
               <a:rPr lang="en-US" b="0" i="0" u="none" strike="noStrike" dirty="0">
                 <a:effectLst/>
                 <a:latin typeface="Open Sans"/>
                 <a:hlinkClick r:id="rId2"/>
               </a:rPr>
-              <a:t>http://localhost:8180/Testapp</a:t>
+              <a:t>olatundemma006@gmail.com</a:t>
+            </a:r>
+            <a:endParaRPr lang="en-US" b="0" i="0" u="none" strike="noStrike" dirty="0">
+              <a:effectLst/>
+              <a:latin typeface="Open Sans"/>
+            </a:endParaRPr>
+          </a:p>
+          <a:p>
+            <a:pPr lvl="2">
+              <a:buClr>
+                <a:schemeClr val="tx1"/>
+              </a:buClr>
+              <a:buFont typeface="Arial" panose="020B0604020202020204" pitchFamily="34" charset="0"/>
+              <a:buChar char="•"/>
+            </a:pPr>
+            <a:r>
+              <a:rPr lang="en-US" b="0" i="0" u="none" strike="noStrike" dirty="0">
+                <a:effectLst/>
+                <a:latin typeface="Open Sans"/>
+                <a:hlinkClick r:id="rId3"/>
+              </a:rPr>
+              <a:t>olatundemma007@gmail.com</a:t>
+            </a:r>
+            <a:endParaRPr lang="en-US" b="0" i="0" u="none" strike="noStrike" dirty="0">
+              <a:effectLst/>
+              <a:latin typeface="Open Sans"/>
+            </a:endParaRPr>
+          </a:p>
+          <a:p>
+            <a:pPr lvl="2">
+              <a:buClr>
+                <a:schemeClr val="tx1"/>
+              </a:buClr>
+              <a:buFont typeface="Arial" panose="020B0604020202020204" pitchFamily="34" charset="0"/>
+              <a:buChar char="•"/>
+            </a:pPr>
+            <a:r>
+              <a:rPr lang="en-US" b="0" i="0" u="none" strike="noStrike" dirty="0">
+                <a:effectLst/>
+                <a:latin typeface="Open Sans"/>
+                <a:hlinkClick r:id="rId4"/>
+              </a:rPr>
+              <a:t>seymicheal007@gmail.com</a:t>
             </a:r>
             <a:endParaRPr lang="en-US" b="0" i="0" u="none" strike="noStrike" dirty="0">
               <a:effectLst/>
@@ -6485,6 +6495,79 @@
               <a:buFont typeface="Arial" panose="020B0604020202020204" pitchFamily="34" charset="0"/>
               <a:buChar char="•"/>
             </a:pPr>
+            <a:r>
+              <a:rPr lang="en-US" dirty="0">
+                <a:latin typeface="Open Sans"/>
+              </a:rPr>
+              <a:t>Web Application</a:t>
+            </a:r>
+          </a:p>
+          <a:p>
+            <a:pPr lvl="1">
+              <a:buClr>
+                <a:schemeClr val="tx1"/>
+              </a:buClr>
+              <a:buFont typeface="Wingdings" panose="05000000000000000000" pitchFamily="2" charset="2"/>
+              <a:buChar char="v"/>
+            </a:pPr>
+            <a:r>
+              <a:rPr lang="en-US" dirty="0">
+                <a:latin typeface="Open Sans"/>
+              </a:rPr>
+              <a:t>Created Azure App</a:t>
+            </a:r>
+          </a:p>
+          <a:p>
+            <a:pPr lvl="2">
+              <a:buClr>
+                <a:schemeClr val="tx1"/>
+              </a:buClr>
+              <a:buFont typeface="Wingdings" panose="05000000000000000000" pitchFamily="2" charset="2"/>
+              <a:buChar char="v"/>
+            </a:pPr>
+            <a:r>
+              <a:rPr lang="en-US" b="0" i="0" u="none" strike="noStrike" dirty="0">
+                <a:effectLst/>
+                <a:latin typeface="Open Sans"/>
+              </a:rPr>
+              <a:t>My-</a:t>
+            </a:r>
+            <a:r>
+              <a:rPr lang="en-US" b="0" i="0" u="none" strike="noStrike" dirty="0" err="1">
+                <a:effectLst/>
+                <a:latin typeface="Open Sans"/>
+              </a:rPr>
+              <a:t>keycloak</a:t>
+            </a:r>
+            <a:r>
+              <a:rPr lang="en-US" b="0" i="0" u="none" strike="noStrike" dirty="0">
+                <a:effectLst/>
+                <a:latin typeface="Open Sans"/>
+              </a:rPr>
+              <a:t>-app (</a:t>
+            </a:r>
+            <a:r>
+              <a:rPr lang="en-US" b="0" i="0" u="none" strike="noStrike" dirty="0" err="1">
+                <a:effectLst/>
+                <a:latin typeface="Open Sans"/>
+              </a:rPr>
+              <a:t>eolatunde</a:t>
+            </a:r>
+            <a:r>
+              <a:rPr lang="en-US" b="0" i="0" u="none" strike="noStrike" dirty="0">
+                <a:effectLst/>
+                <a:latin typeface="Open Sans"/>
+              </a:rPr>
+              <a:t> AZURE AD - Highstep)</a:t>
+            </a:r>
+          </a:p>
+          <a:p>
+            <a:pPr marL="201168" lvl="1" indent="0">
+              <a:buClr>
+                <a:schemeClr val="tx1"/>
+              </a:buClr>
+              <a:buNone/>
+            </a:pPr>
             <a:endParaRPr lang="en-US" b="0" i="0" u="none" strike="noStrike" dirty="0">
               <a:effectLst/>
               <a:latin typeface="Open Sans"/>
@@ -6546,7 +6629,7 @@
           <a:p>
             <a:r>
               <a:rPr lang="en-US" dirty="0"/>
-              <a:t>Database access details</a:t>
+              <a:t>References</a:t>
             </a:r>
           </a:p>
         </p:txBody>
@@ -6588,28 +6671,28 @@
             </a:pPr>
             <a:r>
               <a:rPr lang="en-US" sz="1800" b="1" dirty="0">
-                <a:effectLst/>
                 <a:latin typeface="Times New Roman" panose="02020603050405020304" pitchFamily="18" charset="0"/>
                 <a:ea typeface="Calibri" panose="020F0502020204030204" pitchFamily="34" charset="0"/>
                 <a:cs typeface="Times New Roman" panose="02020603050405020304" pitchFamily="18" charset="0"/>
               </a:rPr>
-              <a:t>Server/hostname:  </a:t>
-            </a:r>
-            <a:r>
-              <a:rPr lang="en-US" sz="1800" dirty="0">
-                <a:effectLst/>
+              <a:t>The slides below are not required: They are simply meant to test </a:t>
+            </a:r>
+            <a:r>
+              <a:rPr lang="en-US" sz="1800" b="1" dirty="0" err="1">
                 <a:latin typeface="Times New Roman" panose="02020603050405020304" pitchFamily="18" charset="0"/>
                 <a:ea typeface="Calibri" panose="020F0502020204030204" pitchFamily="34" charset="0"/>
                 <a:cs typeface="Times New Roman" panose="02020603050405020304" pitchFamily="18" charset="0"/>
               </a:rPr>
-              <a:t>hs-psql1</a:t>
-            </a:r>
-            <a:endParaRPr lang="en-US" sz="1800" dirty="0">
-              <a:effectLst/>
-              <a:latin typeface="Calibri" panose="020F0502020204030204" pitchFamily="34" charset="0"/>
-              <a:ea typeface="Calibri" panose="020F0502020204030204" pitchFamily="34" charset="0"/>
-              <a:cs typeface="Times New Roman" panose="02020603050405020304" pitchFamily="18" charset="0"/>
-            </a:endParaRPr>
+              <a:t>Keycloak</a:t>
+            </a:r>
+            <a:r>
+              <a:rPr lang="en-US" sz="1800" b="1" dirty="0">
+                <a:latin typeface="Times New Roman" panose="02020603050405020304" pitchFamily="18" charset="0"/>
+                <a:ea typeface="Calibri" panose="020F0502020204030204" pitchFamily="34" charset="0"/>
+                <a:cs typeface="Times New Roman" panose="02020603050405020304" pitchFamily="18" charset="0"/>
+              </a:rPr>
+              <a:t> with a Client Application</a:t>
+            </a:r>
           </a:p>
           <a:p>
             <a:pPr marL="457200" marR="0" lvl="1" indent="0">
@@ -6624,27 +6707,9 @@
               </a:spcAft>
               <a:buNone/>
             </a:pPr>
-            <a:r>
-              <a:rPr lang="en-US" sz="1800" b="1" dirty="0">
-                <a:effectLst/>
-                <a:latin typeface="Times New Roman" panose="02020603050405020304" pitchFamily="18" charset="0"/>
-                <a:ea typeface="Calibri" panose="020F0502020204030204" pitchFamily="34" charset="0"/>
-                <a:cs typeface="Times New Roman" panose="02020603050405020304" pitchFamily="18" charset="0"/>
-              </a:rPr>
-              <a:t>Database: </a:t>
-            </a:r>
-            <a:r>
-              <a:rPr lang="en-US" sz="1800" dirty="0">
-                <a:effectLst/>
-                <a:latin typeface="Times New Roman" panose="02020603050405020304" pitchFamily="18" charset="0"/>
-                <a:ea typeface="Calibri" panose="020F0502020204030204" pitchFamily="34" charset="0"/>
-                <a:cs typeface="Times New Roman" panose="02020603050405020304" pitchFamily="18" charset="0"/>
-              </a:rPr>
-              <a:t>wikijstest</a:t>
-            </a:r>
-            <a:endParaRPr lang="en-US" sz="1800" dirty="0">
+            <a:endParaRPr lang="en-US" sz="1800" b="1" dirty="0">
               <a:effectLst/>
-              <a:latin typeface="Calibri" panose="020F0502020204030204" pitchFamily="34" charset="0"/>
+              <a:latin typeface="Times New Roman" panose="02020603050405020304" pitchFamily="18" charset="0"/>
               <a:ea typeface="Calibri" panose="020F0502020204030204" pitchFamily="34" charset="0"/>
               <a:cs typeface="Times New Roman" panose="02020603050405020304" pitchFamily="18" charset="0"/>
             </a:endParaRPr>
@@ -6663,29 +6728,14 @@
               <a:buNone/>
             </a:pPr>
             <a:r>
-              <a:rPr lang="en-US" sz="1800" b="1" dirty="0">
+              <a:rPr lang="en-US" sz="1800" dirty="0">
                 <a:effectLst/>
                 <a:latin typeface="Times New Roman" panose="02020603050405020304" pitchFamily="18" charset="0"/>
                 <a:ea typeface="Calibri" panose="020F0502020204030204" pitchFamily="34" charset="0"/>
                 <a:cs typeface="Times New Roman" panose="02020603050405020304" pitchFamily="18" charset="0"/>
               </a:rPr>
-              <a:t>Username: </a:t>
-            </a:r>
-            <a:r>
-              <a:rPr lang="en-US" sz="1800" dirty="0">
-                <a:effectLst/>
-                <a:latin typeface="Times New Roman" panose="02020603050405020304" pitchFamily="18" charset="0"/>
-                <a:ea typeface="Calibri" panose="020F0502020204030204" pitchFamily="34" charset="0"/>
-                <a:cs typeface="Times New Roman" panose="02020603050405020304" pitchFamily="18" charset="0"/>
-              </a:rPr>
-              <a:t>wikijs</a:t>
-            </a:r>
-            <a:endParaRPr lang="en-US" sz="1800" dirty="0">
-              <a:effectLst/>
-              <a:latin typeface="Calibri" panose="020F0502020204030204" pitchFamily="34" charset="0"/>
-              <a:ea typeface="Calibri" panose="020F0502020204030204" pitchFamily="34" charset="0"/>
-              <a:cs typeface="Times New Roman" panose="02020603050405020304" pitchFamily="18" charset="0"/>
-            </a:endParaRPr>
+              <a:t>Client Code: https://github.com/Emanoid/React-Keycloak-Application.git</a:t>
+            </a:r>
           </a:p>
           <a:p>
             <a:pPr marL="457200" marR="0" lvl="1" indent="0">
@@ -6700,126 +6750,6 @@
               </a:spcAft>
               <a:buNone/>
             </a:pPr>
-            <a:r>
-              <a:rPr lang="en-US" sz="1800" b="1" dirty="0">
-                <a:effectLst/>
-                <a:latin typeface="Times New Roman" panose="02020603050405020304" pitchFamily="18" charset="0"/>
-                <a:ea typeface="Calibri" panose="020F0502020204030204" pitchFamily="34" charset="0"/>
-                <a:cs typeface="Times New Roman" panose="02020603050405020304" pitchFamily="18" charset="0"/>
-              </a:rPr>
-              <a:t>Password: </a:t>
-            </a:r>
-            <a:r>
-              <a:rPr lang="en-US" sz="1800" dirty="0">
-                <a:effectLst/>
-                <a:latin typeface="Times New Roman" panose="02020603050405020304" pitchFamily="18" charset="0"/>
-                <a:ea typeface="Calibri" panose="020F0502020204030204" pitchFamily="34" charset="0"/>
-                <a:cs typeface="Times New Roman" panose="02020603050405020304" pitchFamily="18" charset="0"/>
-              </a:rPr>
-              <a:t>wikijs@highstep</a:t>
-            </a:r>
-          </a:p>
-          <a:p>
-            <a:pPr marL="457200" marR="0" lvl="1" indent="0">
-              <a:lnSpc>
-                <a:spcPct val="107000"/>
-              </a:lnSpc>
-              <a:spcBef>
-                <a:spcPts val="0"/>
-              </a:spcBef>
-              <a:spcAft>
-                <a:spcPts val="800"/>
-              </a:spcAft>
-              <a:buNone/>
-            </a:pPr>
-            <a:r>
-              <a:rPr lang="en-US" sz="1800" u="sng" dirty="0">
-                <a:latin typeface="Times New Roman" panose="02020603050405020304" pitchFamily="18" charset="0"/>
-                <a:ea typeface="Calibri" panose="020F0502020204030204" pitchFamily="34" charset="0"/>
-                <a:cs typeface="Times New Roman" panose="02020603050405020304" pitchFamily="18" charset="0"/>
-              </a:rPr>
-              <a:t>Admin Login</a:t>
-            </a:r>
-            <a:r>
-              <a:rPr lang="en-US" sz="1800" u="sng" dirty="0">
-                <a:effectLst/>
-                <a:latin typeface="Times New Roman" panose="02020603050405020304" pitchFamily="18" charset="0"/>
-                <a:ea typeface="Calibri" panose="020F0502020204030204" pitchFamily="34" charset="0"/>
-                <a:cs typeface="Times New Roman" panose="02020603050405020304" pitchFamily="18" charset="0"/>
-              </a:rPr>
-              <a:t> Details:</a:t>
-            </a:r>
-          </a:p>
-          <a:p>
-            <a:pPr marL="457200" marR="0" lvl="1" indent="0">
-              <a:lnSpc>
-                <a:spcPct val="107000"/>
-              </a:lnSpc>
-              <a:spcBef>
-                <a:spcPts val="0"/>
-              </a:spcBef>
-              <a:spcAft>
-                <a:spcPts val="800"/>
-              </a:spcAft>
-              <a:buNone/>
-            </a:pPr>
-            <a:r>
-              <a:rPr lang="en-US" sz="1800" b="1" dirty="0">
-                <a:latin typeface="Calibri" panose="020F0502020204030204" pitchFamily="34" charset="0"/>
-                <a:ea typeface="Calibri" panose="020F0502020204030204" pitchFamily="34" charset="0"/>
-                <a:cs typeface="Times New Roman" panose="02020603050405020304" pitchFamily="18" charset="0"/>
-              </a:rPr>
-              <a:t>Username: </a:t>
-            </a:r>
-            <a:r>
-              <a:rPr lang="en-US" sz="1800" dirty="0">
-                <a:latin typeface="Calibri" panose="020F0502020204030204" pitchFamily="34" charset="0"/>
-                <a:ea typeface="Calibri" panose="020F0502020204030204" pitchFamily="34" charset="0"/>
-                <a:cs typeface="Times New Roman" panose="02020603050405020304" pitchFamily="18" charset="0"/>
-              </a:rPr>
-              <a:t>Emmanuel</a:t>
-            </a:r>
-          </a:p>
-          <a:p>
-            <a:pPr marL="457200" marR="0" lvl="1" indent="0">
-              <a:lnSpc>
-                <a:spcPct val="107000"/>
-              </a:lnSpc>
-              <a:spcBef>
-                <a:spcPts val="0"/>
-              </a:spcBef>
-              <a:spcAft>
-                <a:spcPts val="800"/>
-              </a:spcAft>
-              <a:buNone/>
-            </a:pPr>
-            <a:r>
-              <a:rPr lang="en-US" sz="1800" b="1" dirty="0">
-                <a:latin typeface="Calibri" panose="020F0502020204030204" pitchFamily="34" charset="0"/>
-                <a:ea typeface="Calibri" panose="020F0502020204030204" pitchFamily="34" charset="0"/>
-                <a:cs typeface="Times New Roman" panose="02020603050405020304" pitchFamily="18" charset="0"/>
-              </a:rPr>
-              <a:t>Password: !Keycloak5</a:t>
-            </a:r>
-            <a:endParaRPr lang="en-US" sz="1800" dirty="0">
-              <a:latin typeface="Calibri" panose="020F0502020204030204" pitchFamily="34" charset="0"/>
-              <a:ea typeface="Calibri" panose="020F0502020204030204" pitchFamily="34" charset="0"/>
-              <a:cs typeface="Times New Roman" panose="02020603050405020304" pitchFamily="18" charset="0"/>
-            </a:endParaRPr>
-          </a:p>
-          <a:p>
-            <a:pPr marL="457200" marR="0" lvl="1" indent="0">
-              <a:lnSpc>
-                <a:spcPct val="107000"/>
-              </a:lnSpc>
-              <a:spcBef>
-                <a:spcPts val="0"/>
-              </a:spcBef>
-              <a:spcAft>
-                <a:spcPts val="800"/>
-              </a:spcAft>
-              <a:buNone/>
-            </a:pPr>
             <a:endParaRPr lang="en-US" sz="1800" dirty="0">
               <a:effectLst/>
               <a:latin typeface="Times New Roman" panose="02020603050405020304" pitchFamily="18" charset="0"/>
@@ -6869,7 +6799,7 @@
     </p:spTree>
     <p:extLst>
       <p:ext uri="{BB962C8B-B14F-4D97-AF65-F5344CB8AC3E}">
-        <p14:creationId xmlns:p14="http://schemas.microsoft.com/office/powerpoint/2010/main" val="2540365031"/>
+        <p14:creationId xmlns:p14="http://schemas.microsoft.com/office/powerpoint/2010/main" val="1218484132"/>
       </p:ext>
     </p:extLst>
   </p:cSld>
@@ -6924,7 +6854,7 @@
           <a:p>
             <a:r>
               <a:rPr lang="en-US" dirty="0"/>
-              <a:t>IDENTITY PROVIDERS: SOCIAL LOGINS</a:t>
+              <a:t>Installing sample code to secure the application</a:t>
             </a:r>
           </a:p>
         </p:txBody>
@@ -6965,15 +6895,12 @@
               <a:buChar char="•"/>
             </a:pPr>
             <a:r>
-              <a:rPr lang="en-US" dirty="0">
+              <a:rPr lang="en-US" b="0" i="0" u="none" strike="noStrike" dirty="0">
+                <a:effectLst/>
                 <a:latin typeface="Open Sans"/>
               </a:rPr>
-              <a:t>Created Google App</a:t>
-            </a:r>
-            <a:endParaRPr lang="en-US" b="0" i="0" u="none" strike="noStrike" dirty="0">
-              <a:effectLst/>
-              <a:latin typeface="Open Sans"/>
-            </a:endParaRPr>
+              <a:t>Pre-requisites:</a:t>
+            </a:r>
           </a:p>
           <a:p>
             <a:pPr lvl="1">
@@ -6987,7 +6914,7 @@
               <a:rPr lang="en-US" dirty="0">
                 <a:latin typeface="Open Sans"/>
               </a:rPr>
-              <a:t>eolatunde@highstep.com</a:t>
+              <a:t>Java JDK 8</a:t>
             </a:r>
           </a:p>
           <a:p>
@@ -6999,32 +6926,11 @@
               <a:buChar char="•"/>
             </a:pPr>
             <a:r>
-              <a:rPr lang="en-US" b="0" i="0" u="none" strike="noStrike" dirty="0" err="1">
+              <a:rPr lang="en-US" b="0" i="0" u="none" strike="noStrike" dirty="0">
                 <a:effectLst/>
                 <a:latin typeface="Open Sans"/>
               </a:rPr>
-              <a:t>Oauth</a:t>
-            </a:r>
-            <a:r>
-              <a:rPr lang="en-US" b="0" i="0" u="none" strike="noStrike" dirty="0">
-                <a:effectLst/>
-                <a:latin typeface="Open Sans"/>
-              </a:rPr>
-              <a:t> </a:t>
-            </a:r>
-            <a:r>
-              <a:rPr lang="en-US" b="0" i="0" u="none" strike="noStrike" dirty="0" err="1">
-                <a:effectLst/>
-                <a:latin typeface="Open Sans"/>
-              </a:rPr>
-              <a:t>concent</a:t>
-            </a:r>
-            <a:r>
-              <a:rPr lang="en-US" b="0" i="0" u="none" strike="noStrike" dirty="0">
-                <a:effectLst/>
-                <a:latin typeface="Open Sans"/>
-              </a:rPr>
-              <a:t> App</a:t>
+              <a:t>Apache Maven 3.1.1 or higher</a:t>
             </a:r>
           </a:p>
           <a:p>
@@ -7036,22 +6942,39 @@
               <a:buChar char="•"/>
             </a:pPr>
             <a:r>
+              <a:rPr lang="en-US" dirty="0" err="1">
+                <a:latin typeface="Open Sans"/>
+              </a:rPr>
+              <a:t>Git</a:t>
+            </a:r>
+            <a:r>
+              <a:rPr lang="en-US" b="0" i="0" u="none" strike="noStrike" dirty="0" err="1">
+                <a:effectLst/>
+                <a:latin typeface="Open Sans"/>
+              </a:rPr>
+              <a:t>Pre</a:t>
+            </a:r>
+            <a:r>
+              <a:rPr lang="en-US" b="0" i="0" u="none" strike="noStrike" dirty="0">
+                <a:effectLst/>
+                <a:latin typeface="Open Sans"/>
+              </a:rPr>
+              <a:t>-requisites:</a:t>
+            </a:r>
+          </a:p>
+          <a:p>
+            <a:pPr>
+              <a:buClr>
+                <a:schemeClr val="tx1"/>
+              </a:buClr>
+              <a:buFont typeface="Arial" panose="020B0604020202020204" pitchFamily="34" charset="0"/>
+              <a:buChar char="•"/>
+            </a:pPr>
+            <a:r>
               <a:rPr lang="en-US" dirty="0">
                 <a:latin typeface="Open Sans"/>
               </a:rPr>
-              <a:t>Name: my-</a:t>
-            </a:r>
-            <a:r>
-              <a:rPr lang="en-US" dirty="0" err="1">
-                <a:latin typeface="Open Sans"/>
-              </a:rPr>
-              <a:t>keyclaok</a:t>
-            </a:r>
-            <a:r>
-              <a:rPr lang="en-US" dirty="0">
-                <a:latin typeface="Open Sans"/>
-              </a:rPr>
-              <a:t>-app</a:t>
+              <a:t>In main directory</a:t>
             </a:r>
           </a:p>
           <a:p>
@@ -7063,81 +6986,11 @@
               <a:buChar char="•"/>
             </a:pPr>
             <a:r>
-              <a:rPr lang="en-US" b="0" i="0" u="none" strike="noStrike" dirty="0">
-                <a:effectLst/>
-                <a:latin typeface="Open Sans"/>
-              </a:rPr>
-              <a:t>Authori</a:t>
-            </a:r>
-            <a:r>
               <a:rPr lang="en-US" dirty="0">
                 <a:latin typeface="Open Sans"/>
               </a:rPr>
-              <a:t>zed users</a:t>
-            </a:r>
-          </a:p>
-          <a:p>
-            <a:pPr lvl="2">
-              <a:buClr>
-                <a:schemeClr val="tx1"/>
-              </a:buClr>
-              <a:buFont typeface="Arial" panose="020B0604020202020204" pitchFamily="34" charset="0"/>
-              <a:buChar char="•"/>
-            </a:pPr>
-            <a:r>
-              <a:rPr lang="en-US" b="0" i="0" u="none" strike="noStrike" dirty="0">
-                <a:effectLst/>
-                <a:latin typeface="Open Sans"/>
-                <a:hlinkClick r:id="rId2"/>
-              </a:rPr>
-              <a:t>olatundemma006@gmail.com</a:t>
-            </a:r>
-            <a:endParaRPr lang="en-US" b="0" i="0" u="none" strike="noStrike" dirty="0">
-              <a:effectLst/>
-              <a:latin typeface="Open Sans"/>
-            </a:endParaRPr>
-          </a:p>
-          <a:p>
-            <a:pPr lvl="2">
-              <a:buClr>
-                <a:schemeClr val="tx1"/>
-              </a:buClr>
-              <a:buFont typeface="Arial" panose="020B0604020202020204" pitchFamily="34" charset="0"/>
-              <a:buChar char="•"/>
-            </a:pPr>
-            <a:r>
-              <a:rPr lang="en-US" b="0" i="0" u="none" strike="noStrike" dirty="0">
-                <a:effectLst/>
-                <a:latin typeface="Open Sans"/>
-                <a:hlinkClick r:id="rId3"/>
-              </a:rPr>
-              <a:t>olatundemma007@gmail.com</a:t>
-            </a:r>
-            <a:endParaRPr lang="en-US" b="0" i="0" u="none" strike="noStrike" dirty="0">
-              <a:effectLst/>
-              <a:latin typeface="Open Sans"/>
-            </a:endParaRPr>
-          </a:p>
-          <a:p>
-            <a:pPr lvl="2">
-              <a:buClr>
-                <a:schemeClr val="tx1"/>
-              </a:buClr>
-              <a:buFont typeface="Arial" panose="020B0604020202020204" pitchFamily="34" charset="0"/>
-              <a:buChar char="•"/>
-            </a:pPr>
-            <a:r>
-              <a:rPr lang="en-US" b="0" i="0" u="none" strike="noStrike" dirty="0">
-                <a:effectLst/>
-                <a:latin typeface="Open Sans"/>
-                <a:hlinkClick r:id="rId4"/>
-              </a:rPr>
-              <a:t>seymicheal007@gmail.com</a:t>
-            </a:r>
-            <a:endParaRPr lang="en-US" b="0" i="0" u="none" strike="noStrike" dirty="0">
-              <a:effectLst/>
-              <a:latin typeface="Open Sans"/>
-            </a:endParaRPr>
+              <a:t>git clone https://github.com/keycloak/keycloak-quickstarts</a:t>
+            </a:r>
           </a:p>
           <a:p>
             <a:pPr lvl="1">
@@ -7151,7 +7004,31 @@
               <a:rPr lang="en-US" dirty="0">
                 <a:latin typeface="Open Sans"/>
               </a:rPr>
-              <a:t>Web Application</a:t>
+              <a:t>cd </a:t>
+            </a:r>
+            <a:r>
+              <a:rPr lang="en-US" dirty="0" err="1">
+                <a:latin typeface="Open Sans"/>
+              </a:rPr>
+              <a:t>keycloak-quickstarts</a:t>
+            </a:r>
+            <a:r>
+              <a:rPr lang="en-US" dirty="0">
+                <a:latin typeface="Open Sans"/>
+              </a:rPr>
+              <a:t>/app-profile-</a:t>
+            </a:r>
+            <a:r>
+              <a:rPr lang="en-US" dirty="0" err="1">
+                <a:latin typeface="Open Sans"/>
+              </a:rPr>
+              <a:t>jee</a:t>
+            </a:r>
+            <a:r>
+              <a:rPr lang="en-US" dirty="0">
+                <a:latin typeface="Open Sans"/>
+              </a:rPr>
+              <a:t>-vanilla/config</a:t>
             </a:r>
           </a:p>
           <a:p>
@@ -7159,66 +7036,35 @@
               <a:buClr>
                 <a:schemeClr val="tx1"/>
               </a:buClr>
-              <a:buFont typeface="Wingdings" panose="05000000000000000000" pitchFamily="2" charset="2"/>
-              <a:buChar char="v"/>
+              <a:buFont typeface="Arial" panose="020B0604020202020204" pitchFamily="34" charset="0"/>
+              <a:buChar char="•"/>
             </a:pPr>
             <a:r>
               <a:rPr lang="en-US" dirty="0">
                 <a:latin typeface="Open Sans"/>
               </a:rPr>
-              <a:t>Created Azure App</a:t>
-            </a:r>
-          </a:p>
-          <a:p>
-            <a:pPr lvl="2">
+              <a:t>Copy the ‘</a:t>
+            </a:r>
+            <a:r>
+              <a:rPr lang="en-US" dirty="0" err="1">
+                <a:latin typeface="Open Sans"/>
+              </a:rPr>
+              <a:t>keycloak.json</a:t>
+            </a:r>
+            <a:r>
+              <a:rPr lang="en-US" dirty="0">
+                <a:latin typeface="Open Sans"/>
+              </a:rPr>
+              <a:t>’ file onto the above directory</a:t>
+            </a:r>
+          </a:p>
+          <a:p>
+            <a:pPr lvl="1">
               <a:buClr>
                 <a:schemeClr val="tx1"/>
               </a:buClr>
-              <a:buFont typeface="Wingdings" panose="05000000000000000000" pitchFamily="2" charset="2"/>
-              <a:buChar char="v"/>
-            </a:pPr>
-            <a:r>
-              <a:rPr lang="en-US" b="0" i="0" u="none" strike="noStrike" dirty="0">
-                <a:effectLst/>
-                <a:latin typeface="Open Sans"/>
-              </a:rPr>
-              <a:t>My-</a:t>
-            </a:r>
-            <a:r>
-              <a:rPr lang="en-US" b="0" i="0" u="none" strike="noStrike" dirty="0" err="1">
-                <a:effectLst/>
-                <a:latin typeface="Open Sans"/>
-              </a:rPr>
-              <a:t>keycloak</a:t>
-            </a:r>
-            <a:r>
-              <a:rPr lang="en-US" b="0" i="0" u="none" strike="noStrike" dirty="0">
-                <a:effectLst/>
-                <a:latin typeface="Open Sans"/>
-              </a:rPr>
-              <a:t>-app (</a:t>
-            </a:r>
-            <a:r>
-              <a:rPr lang="en-US" b="0" i="0" u="none" strike="noStrike" dirty="0" err="1">
-                <a:effectLst/>
-                <a:latin typeface="Open Sans"/>
-              </a:rPr>
-              <a:t>eolatunde</a:t>
-            </a:r>
-            <a:r>
-              <a:rPr lang="en-US" b="0" i="0" u="none" strike="noStrike" dirty="0">
-                <a:effectLst/>
-                <a:latin typeface="Open Sans"/>
-              </a:rPr>
-              <a:t> AZURE AD - Highstep)</a:t>
-            </a:r>
-          </a:p>
-          <a:p>
-            <a:pPr marL="201168" lvl="1" indent="0">
-              <a:buClr>
-                <a:schemeClr val="tx1"/>
-              </a:buClr>
-              <a:buNone/>
+              <a:buFont typeface="Arial" panose="020B0604020202020204" pitchFamily="34" charset="0"/>
+              <a:buChar char="•"/>
             </a:pPr>
             <a:endParaRPr lang="en-US" b="0" i="0" u="none" strike="noStrike" dirty="0">
               <a:effectLst/>
@@ -7281,7 +7127,15 @@
           <a:p>
             <a:r>
               <a:rPr lang="en-US" dirty="0"/>
-              <a:t>References</a:t>
+              <a:t>Java </a:t>
+            </a:r>
+            <a:r>
+              <a:rPr lang="en-US" dirty="0" err="1"/>
+              <a:t>jdk</a:t>
+            </a:r>
+            <a:r>
+              <a:rPr lang="en-US" dirty="0"/>
+              <a:t> download credentials</a:t>
             </a:r>
           </a:p>
         </p:txBody>
@@ -7327,67 +7181,32 @@
                 <a:ea typeface="Calibri" panose="020F0502020204030204" pitchFamily="34" charset="0"/>
                 <a:cs typeface="Times New Roman" panose="02020603050405020304" pitchFamily="18" charset="0"/>
               </a:rPr>
-              <a:t>The slides below are not required: They are simply meant to test </a:t>
-            </a:r>
-            <a:r>
-              <a:rPr lang="en-US" sz="1800" b="1" dirty="0" err="1">
+              <a:t>Username</a:t>
+            </a:r>
+            <a:r>
+              <a:rPr lang="en-US" sz="1800" b="1" dirty="0">
+                <a:effectLst/>
                 <a:latin typeface="Times New Roman" panose="02020603050405020304" pitchFamily="18" charset="0"/>
                 <a:ea typeface="Calibri" panose="020F0502020204030204" pitchFamily="34" charset="0"/>
                 <a:cs typeface="Times New Roman" panose="02020603050405020304" pitchFamily="18" charset="0"/>
               </a:rPr>
-              <a:t>Keycloak</a:t>
-            </a:r>
-            <a:r>
-              <a:rPr lang="en-US" sz="1800" b="1" dirty="0">
+              <a:t>:  </a:t>
+            </a:r>
+            <a:r>
+              <a:rPr lang="en-US" sz="1800" dirty="0">
+                <a:effectLst/>
                 <a:latin typeface="Times New Roman" panose="02020603050405020304" pitchFamily="18" charset="0"/>
                 <a:ea typeface="Calibri" panose="020F0502020204030204" pitchFamily="34" charset="0"/>
                 <a:cs typeface="Times New Roman" panose="02020603050405020304" pitchFamily="18" charset="0"/>
               </a:rPr>
-              <a:t> with a Client Application</a:t>
-            </a:r>
-          </a:p>
-          <a:p>
-            <a:pPr marL="457200" marR="0" lvl="1" indent="0">
-              <a:lnSpc>
-                <a:spcPct val="107000"/>
-              </a:lnSpc>
-              <a:spcBef>
-                <a:spcPts val="0"/>
-              </a:spcBef>
-              <a:spcAft>
-                <a:spcPts val="0"/>
-              </a:spcAft>
-              <a:buNone/>
-            </a:pPr>
-            <a:endParaRPr lang="en-US" sz="1800" b="1" dirty="0">
+              <a:t>seymicheal007@gmail.com</a:t>
+            </a:r>
+            <a:endParaRPr lang="en-US" sz="1800" dirty="0">
               <a:effectLst/>
-              <a:latin typeface="Times New Roman" panose="02020603050405020304" pitchFamily="18" charset="0"/>
+              <a:latin typeface="Calibri" panose="020F0502020204030204" pitchFamily="34" charset="0"/>
               <a:ea typeface="Calibri" panose="020F0502020204030204" pitchFamily="34" charset="0"/>
               <a:cs typeface="Times New Roman" panose="02020603050405020304" pitchFamily="18" charset="0"/>
             </a:endParaRPr>
-          </a:p>
-          <a:p>
-            <a:pPr marL="457200" marR="0" lvl="1" indent="0">
-              <a:lnSpc>
-                <a:spcPct val="107000"/>
-              </a:lnSpc>
-              <a:spcBef>
-                <a:spcPts val="0"/>
-              </a:spcBef>
-              <a:spcAft>
-                <a:spcPts val="0"/>
-              </a:spcAft>
-              <a:buNone/>
-            </a:pPr>
-            <a:r>
-              <a:rPr lang="en-US" sz="1800" dirty="0">
-                <a:effectLst/>
-                <a:latin typeface="Times New Roman" panose="02020603050405020304" pitchFamily="18" charset="0"/>
-                <a:ea typeface="Calibri" panose="020F0502020204030204" pitchFamily="34" charset="0"/>
-                <a:cs typeface="Times New Roman" panose="02020603050405020304" pitchFamily="18" charset="0"/>
-              </a:rPr>
-              <a:t>Client Code: https://github.com/Emanoid/React-Keycloak-Application.git</a:t>
-            </a:r>
           </a:p>
           <a:p>
             <a:pPr marL="457200" marR="0" lvl="1" indent="0">
@@ -7402,6 +7221,38 @@
               </a:spcAft>
               <a:buNone/>
             </a:pPr>
+            <a:r>
+              <a:rPr lang="en-US" sz="1800" b="1" dirty="0">
+                <a:effectLst/>
+                <a:latin typeface="Times New Roman" panose="02020603050405020304" pitchFamily="18" charset="0"/>
+                <a:ea typeface="Calibri" panose="020F0502020204030204" pitchFamily="34" charset="0"/>
+                <a:cs typeface="Times New Roman" panose="02020603050405020304" pitchFamily="18" charset="0"/>
+              </a:rPr>
+              <a:t>Password: </a:t>
+            </a:r>
+            <a:r>
+              <a:rPr lang="en-US" sz="1800" dirty="0">
+                <a:effectLst/>
+                <a:latin typeface="Times New Roman" panose="02020603050405020304" pitchFamily="18" charset="0"/>
+                <a:ea typeface="Calibri" panose="020F0502020204030204" pitchFamily="34" charset="0"/>
+                <a:cs typeface="Times New Roman" panose="02020603050405020304" pitchFamily="18" charset="0"/>
+              </a:rPr>
+              <a:t>Highstep Login</a:t>
+            </a:r>
+          </a:p>
+          <a:p>
+            <a:pPr marL="457200" marR="0" lvl="1" indent="0">
+              <a:lnSpc>
+                <a:spcPct val="107000"/>
+              </a:lnSpc>
+              <a:spcBef>
+                <a:spcPts val="0"/>
+              </a:spcBef>
+              <a:spcAft>
+                <a:spcPts val="800"/>
+              </a:spcAft>
+              <a:buNone/>
+            </a:pPr>
             <a:endParaRPr lang="en-US" sz="1800" dirty="0">
               <a:effectLst/>
               <a:latin typeface="Times New Roman" panose="02020603050405020304" pitchFamily="18" charset="0"/>
@@ -7451,7 +7302,7 @@
     </p:spTree>
     <p:extLst>
       <p:ext uri="{BB962C8B-B14F-4D97-AF65-F5344CB8AC3E}">
-        <p14:creationId xmlns:p14="http://schemas.microsoft.com/office/powerpoint/2010/main" val="1218484132"/>
+        <p14:creationId xmlns:p14="http://schemas.microsoft.com/office/powerpoint/2010/main" val="2133349237"/>
       </p:ext>
     </p:extLst>
   </p:cSld>
@@ -7506,509 +7357,6 @@
           <a:p>
             <a:r>
               <a:rPr lang="en-US" dirty="0"/>
-              <a:t>Installing sample code to secure the application</a:t>
-            </a:r>
-          </a:p>
-        </p:txBody>
-      </p:sp>
-      <p:sp>
-        <p:nvSpPr>
-          <p:cNvPr id="3" name="Content Placeholder 2">
-            <a:extLst>
-              <a:ext uri="{FF2B5EF4-FFF2-40B4-BE49-F238E27FC236}">
-                <a16:creationId xmlns:a16="http://schemas.microsoft.com/office/drawing/2014/main" id="{6AB250FE-08C8-4530-B722-29C38A359D8B}"/>
-              </a:ext>
-            </a:extLst>
-          </p:cNvPr>
-          <p:cNvSpPr>
-            <a:spLocks noGrp="1"/>
-          </p:cNvSpPr>
-          <p:nvPr>
-            <p:ph sz="half" idx="2"/>
-          </p:nvPr>
-        </p:nvSpPr>
-        <p:spPr>
-          <a:xfrm>
-            <a:off x="1097280" y="2679032"/>
-            <a:ext cx="4639736" cy="3190063"/>
-          </a:xfrm>
-        </p:spPr>
-        <p:txBody>
-          <a:bodyPr>
-            <a:normAutofit/>
-          </a:bodyPr>
-          <a:lstStyle/>
-          <a:p>
-            <a:pPr>
-              <a:buClr>
-                <a:schemeClr val="tx1"/>
-              </a:buClr>
-              <a:buFont typeface="Arial" panose="020B0604020202020204" pitchFamily="34" charset="0"/>
-              <a:buChar char="•"/>
-            </a:pPr>
-            <a:r>
-              <a:rPr lang="en-US" b="0" i="0" u="none" strike="noStrike" dirty="0">
-                <a:effectLst/>
-                <a:latin typeface="Open Sans"/>
-              </a:rPr>
-              <a:t>Pre-requisites:</a:t>
-            </a:r>
-          </a:p>
-          <a:p>
-            <a:pPr lvl="1">
-              <a:buClr>
-                <a:schemeClr val="tx1"/>
-              </a:buClr>
-              <a:buFont typeface="Arial" panose="020B0604020202020204" pitchFamily="34" charset="0"/>
-              <a:buChar char="•"/>
-            </a:pPr>
-            <a:r>
-              <a:rPr lang="en-US" dirty="0">
-                <a:latin typeface="Open Sans"/>
-              </a:rPr>
-              <a:t>Java JDK 8</a:t>
-            </a:r>
-          </a:p>
-          <a:p>
-            <a:pPr lvl="1">
-              <a:buClr>
-                <a:schemeClr val="tx1"/>
-              </a:buClr>
-              <a:buFont typeface="Arial" panose="020B0604020202020204" pitchFamily="34" charset="0"/>
-              <a:buChar char="•"/>
-            </a:pPr>
-            <a:r>
-              <a:rPr lang="en-US" b="0" i="0" u="none" strike="noStrike" dirty="0">
-                <a:effectLst/>
-                <a:latin typeface="Open Sans"/>
-              </a:rPr>
-              <a:t>Apache Maven 3.1.1 or higher</a:t>
-            </a:r>
-          </a:p>
-          <a:p>
-            <a:pPr lvl="1">
-              <a:buClr>
-                <a:schemeClr val="tx1"/>
-              </a:buClr>
-              <a:buFont typeface="Arial" panose="020B0604020202020204" pitchFamily="34" charset="0"/>
-              <a:buChar char="•"/>
-            </a:pPr>
-            <a:r>
-              <a:rPr lang="en-US" dirty="0" err="1">
-                <a:latin typeface="Open Sans"/>
-              </a:rPr>
-              <a:t>Git</a:t>
-            </a:r>
-            <a:r>
-              <a:rPr lang="en-US" b="0" i="0" u="none" strike="noStrike" dirty="0" err="1">
-                <a:effectLst/>
-                <a:latin typeface="Open Sans"/>
-              </a:rPr>
-              <a:t>Pre</a:t>
-            </a:r>
-            <a:r>
-              <a:rPr lang="en-US" b="0" i="0" u="none" strike="noStrike" dirty="0">
-                <a:effectLst/>
-                <a:latin typeface="Open Sans"/>
-              </a:rPr>
-              <a:t>-requisites:</a:t>
-            </a:r>
-          </a:p>
-          <a:p>
-            <a:pPr>
-              <a:buClr>
-                <a:schemeClr val="tx1"/>
-              </a:buClr>
-              <a:buFont typeface="Arial" panose="020B0604020202020204" pitchFamily="34" charset="0"/>
-              <a:buChar char="•"/>
-            </a:pPr>
-            <a:r>
-              <a:rPr lang="en-US" dirty="0">
-                <a:latin typeface="Open Sans"/>
-              </a:rPr>
-              <a:t>In main directory</a:t>
-            </a:r>
-          </a:p>
-          <a:p>
-            <a:pPr lvl="1">
-              <a:buClr>
-                <a:schemeClr val="tx1"/>
-              </a:buClr>
-              <a:buFont typeface="Arial" panose="020B0604020202020204" pitchFamily="34" charset="0"/>
-              <a:buChar char="•"/>
-            </a:pPr>
-            <a:r>
-              <a:rPr lang="en-US" dirty="0">
-                <a:latin typeface="Open Sans"/>
-              </a:rPr>
-              <a:t>git clone https://github.com/keycloak/keycloak-quickstarts</a:t>
-            </a:r>
-          </a:p>
-          <a:p>
-            <a:pPr lvl="1">
-              <a:buClr>
-                <a:schemeClr val="tx1"/>
-              </a:buClr>
-              <a:buFont typeface="Arial" panose="020B0604020202020204" pitchFamily="34" charset="0"/>
-              <a:buChar char="•"/>
-            </a:pPr>
-            <a:r>
-              <a:rPr lang="en-US" dirty="0">
-                <a:latin typeface="Open Sans"/>
-              </a:rPr>
-              <a:t>cd </a:t>
-            </a:r>
-            <a:r>
-              <a:rPr lang="en-US" dirty="0" err="1">
-                <a:latin typeface="Open Sans"/>
-              </a:rPr>
-              <a:t>keycloak-quickstarts</a:t>
-            </a:r>
-            <a:r>
-              <a:rPr lang="en-US" dirty="0">
-                <a:latin typeface="Open Sans"/>
-              </a:rPr>
-              <a:t>/app-profile-</a:t>
-            </a:r>
-            <a:r>
-              <a:rPr lang="en-US" dirty="0" err="1">
-                <a:latin typeface="Open Sans"/>
-              </a:rPr>
-              <a:t>jee</a:t>
-            </a:r>
-            <a:r>
-              <a:rPr lang="en-US" dirty="0">
-                <a:latin typeface="Open Sans"/>
-              </a:rPr>
-              <a:t>-vanilla/config</a:t>
-            </a:r>
-          </a:p>
-          <a:p>
-            <a:pPr lvl="1">
-              <a:buClr>
-                <a:schemeClr val="tx1"/>
-              </a:buClr>
-              <a:buFont typeface="Arial" panose="020B0604020202020204" pitchFamily="34" charset="0"/>
-              <a:buChar char="•"/>
-            </a:pPr>
-            <a:r>
-              <a:rPr lang="en-US" dirty="0">
-                <a:latin typeface="Open Sans"/>
-              </a:rPr>
-              <a:t>Copy the ‘</a:t>
-            </a:r>
-            <a:r>
-              <a:rPr lang="en-US" dirty="0" err="1">
-                <a:latin typeface="Open Sans"/>
-              </a:rPr>
-              <a:t>keycloak.json</a:t>
-            </a:r>
-            <a:r>
-              <a:rPr lang="en-US" dirty="0">
-                <a:latin typeface="Open Sans"/>
-              </a:rPr>
-              <a:t>’ file onto the above directory</a:t>
-            </a:r>
-          </a:p>
-          <a:p>
-            <a:pPr lvl="1">
-              <a:buClr>
-                <a:schemeClr val="tx1"/>
-              </a:buClr>
-              <a:buFont typeface="Arial" panose="020B0604020202020204" pitchFamily="34" charset="0"/>
-              <a:buChar char="•"/>
-            </a:pPr>
-            <a:endParaRPr lang="en-US" b="0" i="0" u="none" strike="noStrike" dirty="0">
-              <a:effectLst/>
-              <a:latin typeface="Open Sans"/>
-            </a:endParaRPr>
-          </a:p>
-          <a:p>
-            <a:pPr>
-              <a:buClr>
-                <a:schemeClr val="tx1"/>
-              </a:buClr>
-              <a:buFont typeface="Arial" panose="020B0604020202020204" pitchFamily="34" charset="0"/>
-              <a:buChar char="•"/>
-            </a:pPr>
-            <a:endParaRPr lang="en-US" dirty="0">
-              <a:latin typeface="Microsoft YaHei UI Light" panose="020B0502040204020203" pitchFamily="34" charset="-122"/>
-              <a:ea typeface="Microsoft YaHei UI Light" panose="020B0502040204020203" pitchFamily="34" charset="-122"/>
-            </a:endParaRPr>
-          </a:p>
-          <a:p>
-            <a:pPr marL="0" indent="0">
-              <a:buNone/>
-            </a:pPr>
-            <a:endParaRPr lang="en-US" dirty="0">
-              <a:latin typeface="Microsoft YaHei UI Light" panose="020B0502040204020203" pitchFamily="34" charset="-122"/>
-              <a:ea typeface="Microsoft YaHei UI Light" panose="020B0502040204020203" pitchFamily="34" charset="-122"/>
-            </a:endParaRPr>
-          </a:p>
-          <a:p>
-            <a:pPr marL="0" indent="0">
-              <a:buNone/>
-            </a:pPr>
-            <a:endParaRPr lang="en-US" dirty="0">
-              <a:latin typeface="Microsoft YaHei UI Light" panose="020B0502040204020203" pitchFamily="34" charset="-122"/>
-              <a:ea typeface="Microsoft YaHei UI Light" panose="020B0502040204020203" pitchFamily="34" charset="-122"/>
-            </a:endParaRPr>
-          </a:p>
-        </p:txBody>
-      </p:sp>
-      <p:sp>
-        <p:nvSpPr>
-          <p:cNvPr id="5" name="Text Placeholder 4">
-            <a:extLst>
-              <a:ext uri="{FF2B5EF4-FFF2-40B4-BE49-F238E27FC236}">
-                <a16:creationId xmlns:a16="http://schemas.microsoft.com/office/drawing/2014/main" id="{3CDA0F0A-8BBE-4720-8A8F-47FD935FA9E8}"/>
-              </a:ext>
-            </a:extLst>
-          </p:cNvPr>
-          <p:cNvSpPr>
-            <a:spLocks noGrp="1"/>
-          </p:cNvSpPr>
-          <p:nvPr>
-            <p:ph type="body" sz="quarter" idx="3"/>
-          </p:nvPr>
-        </p:nvSpPr>
-        <p:spPr/>
-        <p:txBody>
-          <a:bodyPr/>
-          <a:lstStyle/>
-          <a:p>
-            <a:r>
-              <a:rPr lang="en-US" dirty="0"/>
-              <a:t>Java </a:t>
-            </a:r>
-            <a:r>
-              <a:rPr lang="en-US" dirty="0" err="1"/>
-              <a:t>jdk</a:t>
-            </a:r>
-            <a:r>
-              <a:rPr lang="en-US" dirty="0"/>
-              <a:t> download credentials</a:t>
-            </a:r>
-          </a:p>
-        </p:txBody>
-      </p:sp>
-      <p:sp>
-        <p:nvSpPr>
-          <p:cNvPr id="6" name="Content Placeholder 5">
-            <a:extLst>
-              <a:ext uri="{FF2B5EF4-FFF2-40B4-BE49-F238E27FC236}">
-                <a16:creationId xmlns:a16="http://schemas.microsoft.com/office/drawing/2014/main" id="{1163EFDC-D9E5-4185-9B8F-C3C93FF516E1}"/>
-              </a:ext>
-            </a:extLst>
-          </p:cNvPr>
-          <p:cNvSpPr>
-            <a:spLocks noGrp="1"/>
-          </p:cNvSpPr>
-          <p:nvPr>
-            <p:ph sz="quarter" idx="4"/>
-          </p:nvPr>
-        </p:nvSpPr>
-        <p:spPr/>
-        <p:txBody>
-          <a:bodyPr>
-            <a:normAutofit/>
-          </a:bodyPr>
-          <a:lstStyle/>
-          <a:p>
-            <a:pPr marL="457200" marR="0" lvl="1" indent="0">
-              <a:lnSpc>
-                <a:spcPct val="107000"/>
-              </a:lnSpc>
-              <a:spcBef>
-                <a:spcPts val="0"/>
-              </a:spcBef>
-              <a:spcAft>
-                <a:spcPts val="0"/>
-              </a:spcAft>
-              <a:buNone/>
-            </a:pPr>
-            <a:r>
-              <a:rPr lang="en-US" sz="1800" b="1" dirty="0">
-                <a:latin typeface="Times New Roman" panose="02020603050405020304" pitchFamily="18" charset="0"/>
-                <a:ea typeface="Calibri" panose="020F0502020204030204" pitchFamily="34" charset="0"/>
-                <a:cs typeface="Times New Roman" panose="02020603050405020304" pitchFamily="18" charset="0"/>
-              </a:rPr>
-              <a:t>Username</a:t>
-            </a:r>
-            <a:r>
-              <a:rPr lang="en-US" sz="1800" b="1" dirty="0">
-                <a:effectLst/>
-                <a:latin typeface="Times New Roman" panose="02020603050405020304" pitchFamily="18" charset="0"/>
-                <a:ea typeface="Calibri" panose="020F0502020204030204" pitchFamily="34" charset="0"/>
-                <a:cs typeface="Times New Roman" panose="02020603050405020304" pitchFamily="18" charset="0"/>
-              </a:rPr>
-              <a:t>:  </a:t>
-            </a:r>
-            <a:r>
-              <a:rPr lang="en-US" sz="1800" dirty="0">
-                <a:effectLst/>
-                <a:latin typeface="Times New Roman" panose="02020603050405020304" pitchFamily="18" charset="0"/>
-                <a:ea typeface="Calibri" panose="020F0502020204030204" pitchFamily="34" charset="0"/>
-                <a:cs typeface="Times New Roman" panose="02020603050405020304" pitchFamily="18" charset="0"/>
-              </a:rPr>
-              <a:t>seymicheal007@gmail.com</a:t>
-            </a:r>
-            <a:endParaRPr lang="en-US" sz="1800" dirty="0">
-              <a:effectLst/>
-              <a:latin typeface="Calibri" panose="020F0502020204030204" pitchFamily="34" charset="0"/>
-              <a:ea typeface="Calibri" panose="020F0502020204030204" pitchFamily="34" charset="0"/>
-              <a:cs typeface="Times New Roman" panose="02020603050405020304" pitchFamily="18" charset="0"/>
-            </a:endParaRPr>
-          </a:p>
-          <a:p>
-            <a:pPr marL="457200" marR="0" lvl="1" indent="0">
-              <a:lnSpc>
-                <a:spcPct val="107000"/>
-              </a:lnSpc>
-              <a:spcBef>
-                <a:spcPts val="0"/>
-              </a:spcBef>
-              <a:spcAft>
-                <a:spcPts val="800"/>
-              </a:spcAft>
-              <a:buNone/>
-            </a:pPr>
-            <a:r>
-              <a:rPr lang="en-US" sz="1800" b="1" dirty="0">
-                <a:effectLst/>
-                <a:latin typeface="Times New Roman" panose="02020603050405020304" pitchFamily="18" charset="0"/>
-                <a:ea typeface="Calibri" panose="020F0502020204030204" pitchFamily="34" charset="0"/>
-                <a:cs typeface="Times New Roman" panose="02020603050405020304" pitchFamily="18" charset="0"/>
-              </a:rPr>
-              <a:t>Password: </a:t>
-            </a:r>
-            <a:r>
-              <a:rPr lang="en-US" sz="1800" dirty="0">
-                <a:effectLst/>
-                <a:latin typeface="Times New Roman" panose="02020603050405020304" pitchFamily="18" charset="0"/>
-                <a:ea typeface="Calibri" panose="020F0502020204030204" pitchFamily="34" charset="0"/>
-                <a:cs typeface="Times New Roman" panose="02020603050405020304" pitchFamily="18" charset="0"/>
-              </a:rPr>
-              <a:t>Highstep Login</a:t>
-            </a:r>
-          </a:p>
-          <a:p>
-            <a:pPr marL="457200" marR="0" lvl="1" indent="0">
-              <a:lnSpc>
-                <a:spcPct val="107000"/>
-              </a:lnSpc>
-              <a:spcBef>
-                <a:spcPts val="0"/>
-              </a:spcBef>
-              <a:spcAft>
-                <a:spcPts val="800"/>
-              </a:spcAft>
-              <a:buNone/>
-            </a:pPr>
-            <a:endParaRPr lang="en-US" sz="1800" dirty="0">
-              <a:effectLst/>
-              <a:latin typeface="Times New Roman" panose="02020603050405020304" pitchFamily="18" charset="0"/>
-              <a:ea typeface="Calibri" panose="020F0502020204030204" pitchFamily="34" charset="0"/>
-              <a:cs typeface="Times New Roman" panose="02020603050405020304" pitchFamily="18" charset="0"/>
-            </a:endParaRPr>
-          </a:p>
-        </p:txBody>
-      </p:sp>
-      <p:sp>
-        <p:nvSpPr>
-          <p:cNvPr id="2" name="Title 1">
-            <a:extLst>
-              <a:ext uri="{FF2B5EF4-FFF2-40B4-BE49-F238E27FC236}">
-                <a16:creationId xmlns:a16="http://schemas.microsoft.com/office/drawing/2014/main" id="{CDC62B56-74BF-47D4-B1CD-AF93A810B3B7}"/>
-              </a:ext>
-            </a:extLst>
-          </p:cNvPr>
-          <p:cNvSpPr>
-            <a:spLocks noGrp="1"/>
-          </p:cNvSpPr>
-          <p:nvPr>
-            <p:ph type="title"/>
-          </p:nvPr>
-        </p:nvSpPr>
-        <p:spPr>
-          <a:xfrm>
-            <a:off x="1097280" y="942871"/>
-            <a:ext cx="10058400" cy="587584"/>
-          </a:xfrm>
-        </p:spPr>
-        <p:txBody>
-          <a:bodyPr/>
-          <a:lstStyle/>
-          <a:p>
-            <a:r>
-              <a:rPr lang="en-US" dirty="0" err="1"/>
-              <a:t>Keycloak</a:t>
-            </a:r>
-            <a:r>
-              <a:rPr lang="en-US" dirty="0"/>
-              <a:t> install details</a:t>
-            </a:r>
-          </a:p>
-        </p:txBody>
-      </p:sp>
-    </p:spTree>
-    <p:extLst>
-      <p:ext uri="{BB962C8B-B14F-4D97-AF65-F5344CB8AC3E}">
-        <p14:creationId xmlns:p14="http://schemas.microsoft.com/office/powerpoint/2010/main" val="2133349237"/>
-      </p:ext>
-    </p:extLst>
-  </p:cSld>
-  <p:clrMapOvr>
-    <a:masterClrMapping/>
-  </p:clrMapOvr>
-</p:sld>
-</file>
-
-<file path=ppt/slides/slide14.xml><?xml version="1.0" encoding="utf-8"?>
-<p:sld xmlns:a="http://schemas.openxmlformats.org/drawingml/2006/main" xmlns:r="http://schemas.openxmlformats.org/officeDocument/2006/relationships" xmlns:p="http://schemas.openxmlformats.org/presentationml/2006/main">
-  <p:cSld>
-    <p:spTree>
-      <p:nvGrpSpPr>
-        <p:cNvPr id="1" name=""/>
-        <p:cNvGrpSpPr/>
-        <p:nvPr/>
-      </p:nvGrpSpPr>
-      <p:grpSpPr>
-        <a:xfrm>
-          <a:off x="0" y="0"/>
-          <a:ext cx="0" cy="0"/>
-          <a:chOff x="0" y="0"/>
-          <a:chExt cx="0" cy="0"/>
-        </a:xfrm>
-      </p:grpSpPr>
-      <p:sp>
-        <p:nvSpPr>
-          <p:cNvPr id="4" name="Text Placeholder 3">
-            <a:extLst>
-              <a:ext uri="{FF2B5EF4-FFF2-40B4-BE49-F238E27FC236}">
-                <a16:creationId xmlns:a16="http://schemas.microsoft.com/office/drawing/2014/main" id="{FD850AAA-B77D-4000-A143-0539464CCB02}"/>
-              </a:ext>
-            </a:extLst>
-          </p:cNvPr>
-          <p:cNvSpPr>
-            <a:spLocks noGrp="1"/>
-          </p:cNvSpPr>
-          <p:nvPr>
-            <p:ph type="body" idx="1"/>
-          </p:nvPr>
-        </p:nvSpPr>
-        <p:spPr>
-          <a:xfrm>
-            <a:off x="1097280" y="1888255"/>
-            <a:ext cx="4639736" cy="736282"/>
-          </a:xfrm>
-        </p:spPr>
-        <p:txBody>
-          <a:bodyPr/>
-          <a:lstStyle/>
-          <a:p>
-            <a:r>
-              <a:rPr lang="en-US" dirty="0"/>
               <a:t>Modifying the </a:t>
             </a:r>
             <a:r>
@@ -8738,7 +8086,7 @@
 </p:sld>
 </file>
 
-<file path=ppt/slides/slide15.xml><?xml version="1.0" encoding="utf-8"?>
+<file path=ppt/slides/slide14.xml><?xml version="1.0" encoding="utf-8"?>
 <p:sld xmlns:a="http://schemas.openxmlformats.org/drawingml/2006/main" xmlns:r="http://schemas.openxmlformats.org/officeDocument/2006/relationships" xmlns:p="http://schemas.openxmlformats.org/presentationml/2006/main">
   <p:cSld>
     <p:spTree>
@@ -9281,7 +8629,7 @@
           <a:p>
             <a:r>
               <a:rPr lang="en-US" dirty="0"/>
-              <a:t>TO RUN PostgreSQL</a:t>
+              <a:t>Google (EOLATUNDE@HIGHSTEP.COM)</a:t>
             </a:r>
           </a:p>
         </p:txBody>
@@ -9305,7 +8653,7 @@
         <p:spPr/>
         <p:txBody>
           <a:bodyPr>
-            <a:normAutofit fontScale="85000" lnSpcReduction="10000"/>
+            <a:normAutofit/>
           </a:bodyPr>
           <a:lstStyle/>
           <a:p>
@@ -9314,16 +8662,7 @@
                 <a:latin typeface="Microsoft YaHei UI Light" panose="020B0502040204020203" pitchFamily="34" charset="-122"/>
                 <a:ea typeface="Microsoft YaHei UI Light" panose="020B0502040204020203" pitchFamily="34" charset="-122"/>
               </a:rPr>
-              <a:t>&gt; To get PostgreSQL image</a:t>
-            </a:r>
-          </a:p>
-          <a:p>
-            <a:r>
-              <a:rPr lang="en-US" dirty="0">
-                <a:latin typeface="Microsoft YaHei UI Light" panose="020B0502040204020203" pitchFamily="34" charset="-122"/>
-                <a:ea typeface="Microsoft YaHei UI Light" panose="020B0502040204020203" pitchFamily="34" charset="-122"/>
-              </a:rPr>
-              <a:t>$ docker pull emanoid/postgres</a:t>
+              <a:t>&gt; Access: https://console.cloud.google.com/</a:t>
             </a:r>
           </a:p>
           <a:p>
@@ -9335,19 +8674,18 @@
                 <a:latin typeface="Microsoft YaHei UI Light" panose="020B0502040204020203" pitchFamily="34" charset="-122"/>
                 <a:ea typeface="Microsoft YaHei UI Light" panose="020B0502040204020203" pitchFamily="34" charset="-122"/>
               </a:rPr>
-              <a:t>&gt; To get PgAdmin Image</a:t>
-            </a:r>
-          </a:p>
-          <a:p>
-            <a:r>
-              <a:rPr lang="en-US" dirty="0">
+              <a:t>&gt; Go to “Dashboard” and open Project named “my-</a:t>
+            </a:r>
+            <a:r>
+              <a:rPr lang="en-US" dirty="0" err="1">
+                <a:solidFill>
+                  <a:schemeClr val="tx1"/>
+                </a:solidFill>
                 <a:latin typeface="Microsoft YaHei UI Light" panose="020B0502040204020203" pitchFamily="34" charset="-122"/>
                 <a:ea typeface="Microsoft YaHei UI Light" panose="020B0502040204020203" pitchFamily="34" charset="-122"/>
               </a:rPr>
-              <a:t>$ docker pull emanoid/pgadmin</a:t>
-            </a:r>
-          </a:p>
-          <a:p>
+              <a:t>keycloak</a:t>
+            </a:r>
             <a:r>
               <a:rPr lang="en-US" dirty="0">
                 <a:solidFill>
@@ -9356,23 +8694,65 @@
                 <a:latin typeface="Microsoft YaHei UI Light" panose="020B0502040204020203" pitchFamily="34" charset="-122"/>
                 <a:ea typeface="Microsoft YaHei UI Light" panose="020B0502040204020203" pitchFamily="34" charset="-122"/>
               </a:rPr>
-              <a:t>&gt; To run PostgreSQL on port 5432 in a container </a:t>
-            </a:r>
-          </a:p>
-          <a:p>
+              <a:t>-app” by clicking “Go to Project settings”</a:t>
+            </a:r>
+            <a:endParaRPr lang="en-US" dirty="0">
+              <a:latin typeface="Microsoft YaHei UI Light" panose="020B0502040204020203" pitchFamily="34" charset="-122"/>
+              <a:ea typeface="Microsoft YaHei UI Light" panose="020B0502040204020203" pitchFamily="34" charset="-122"/>
+            </a:endParaRPr>
+          </a:p>
+          <a:p>
+            <a:r>
+              <a:rPr lang="en-US" dirty="0">
+                <a:solidFill>
+                  <a:schemeClr val="tx1"/>
+                </a:solidFill>
+                <a:latin typeface="Microsoft YaHei UI Light" panose="020B0502040204020203" pitchFamily="34" charset="-122"/>
+                <a:ea typeface="Microsoft YaHei UI Light" panose="020B0502040204020203" pitchFamily="34" charset="-122"/>
+              </a:rPr>
+              <a:t>&gt; </a:t>
+            </a:r>
             <a:r>
               <a:rPr lang="en-US" dirty="0">
                 <a:latin typeface="Microsoft YaHei UI Light" panose="020B0502040204020203" pitchFamily="34" charset="-122"/>
                 <a:ea typeface="Microsoft YaHei UI Light" panose="020B0502040204020203" pitchFamily="34" charset="-122"/>
               </a:rPr>
-              <a:t>$ </a:t>
-            </a:r>
-            <a:r>
-              <a:rPr lang="de-DE" dirty="0">
+              <a:t>In the Nav-Bar on the left, open “APIs &amp; Services” and select “</a:t>
+            </a:r>
+            <a:r>
+              <a:rPr lang="en-US" dirty="0" err="1">
                 <a:latin typeface="Microsoft YaHei UI Light" panose="020B0502040204020203" pitchFamily="34" charset="-122"/>
                 <a:ea typeface="Microsoft YaHei UI Light" panose="020B0502040204020203" pitchFamily="34" charset="-122"/>
               </a:rPr>
-              <a:t>docker run -d -p 5432:5432 --name postgres-wikijs --restart unless-stopped -e "DB_TYPE=postgres" -e "DB_HOST=hs-psql1" -e "DB_PORT=5432" -e "DB_USER=wikijs" -e "DB_PASS=wikijs@highstep" -e "DB_NAME=wikijstest" emanoid/postgres</a:t>
+              <a:t>Oauth</a:t>
+            </a:r>
+            <a:r>
+              <a:rPr lang="en-US" dirty="0">
+                <a:latin typeface="Microsoft YaHei UI Light" panose="020B0502040204020203" pitchFamily="34" charset="-122"/>
+                <a:ea typeface="Microsoft YaHei UI Light" panose="020B0502040204020203" pitchFamily="34" charset="-122"/>
+              </a:rPr>
+              <a:t> consent screen”</a:t>
+            </a:r>
+          </a:p>
+          <a:p>
+            <a:r>
+              <a:rPr lang="en-US" dirty="0">
+                <a:solidFill>
+                  <a:schemeClr val="tx1"/>
+                </a:solidFill>
+                <a:latin typeface="Microsoft YaHei UI Light" panose="020B0502040204020203" pitchFamily="34" charset="-122"/>
+                <a:ea typeface="Microsoft YaHei UI Light" panose="020B0502040204020203" pitchFamily="34" charset="-122"/>
+              </a:rPr>
+              <a:t>&gt; Click “Edit App”</a:t>
+            </a:r>
+          </a:p>
+          <a:p>
+            <a:r>
+              <a:rPr lang="en-US" dirty="0">
+                <a:latin typeface="Microsoft YaHei UI Light" panose="020B0502040204020203" pitchFamily="34" charset="-122"/>
+                <a:ea typeface="Microsoft YaHei UI Light" panose="020B0502040204020203" pitchFamily="34" charset="-122"/>
+              </a:rPr>
+              <a:t>&gt;You can make changes here or add users here</a:t>
             </a:r>
             <a:endParaRPr lang="en-US" dirty="0">
               <a:solidFill>
@@ -9407,7 +8787,7 @@
           <a:p>
             <a:r>
               <a:rPr lang="en-US" dirty="0"/>
-              <a:t>Database access details</a:t>
+              <a:t>Users</a:t>
             </a:r>
           </a:p>
         </p:txBody>
@@ -9723,7 +9103,7 @@
           <a:p>
             <a:r>
               <a:rPr lang="en-US" dirty="0"/>
-              <a:t>Database details</a:t>
+              <a:t>External identity provider details</a:t>
             </a:r>
           </a:p>
         </p:txBody>
@@ -9781,7 +9161,7 @@
           <a:p>
             <a:r>
               <a:rPr lang="en-US" dirty="0"/>
-              <a:t>To run pgadmin</a:t>
+              <a:t>Documentation and installation</a:t>
             </a:r>
           </a:p>
         </p:txBody>
@@ -9802,29 +9182,170 @@
             <p:ph sz="half" idx="2"/>
           </p:nvPr>
         </p:nvSpPr>
-        <p:spPr/>
+        <p:spPr>
+          <a:xfrm>
+            <a:off x="1097280" y="2679032"/>
+            <a:ext cx="4639736" cy="3190063"/>
+          </a:xfrm>
+        </p:spPr>
         <p:txBody>
           <a:bodyPr>
-            <a:normAutofit/>
+            <a:normAutofit lnSpcReduction="10000"/>
           </a:bodyPr>
           <a:lstStyle/>
           <a:p>
+            <a:endParaRPr lang="en-US" dirty="0">
+              <a:solidFill>
+                <a:schemeClr val="tx1"/>
+              </a:solidFill>
+              <a:latin typeface="Microsoft YaHei UI Light" panose="020B0502040204020203" pitchFamily="34" charset="-122"/>
+              <a:ea typeface="Microsoft YaHei UI Light" panose="020B0502040204020203" pitchFamily="34" charset="-122"/>
+            </a:endParaRPr>
+          </a:p>
+          <a:p>
+            <a:r>
+              <a:rPr lang="en-US" dirty="0">
+                <a:solidFill>
+                  <a:schemeClr val="tx1"/>
+                </a:solidFill>
+                <a:latin typeface="Microsoft YaHei UI Light" panose="020B0502040204020203" pitchFamily="34" charset="-122"/>
+                <a:ea typeface="Microsoft YaHei UI Light" panose="020B0502040204020203" pitchFamily="34" charset="-122"/>
+              </a:rPr>
+              <a:t>Getting Started: </a:t>
+            </a:r>
+            <a:r>
+              <a:rPr lang="en-US" dirty="0">
+                <a:solidFill>
+                  <a:schemeClr val="tx1"/>
+                </a:solidFill>
+                <a:latin typeface="Microsoft YaHei UI Light" panose="020B0502040204020203" pitchFamily="34" charset="-122"/>
+                <a:ea typeface="Microsoft YaHei UI Light" panose="020B0502040204020203" pitchFamily="34" charset="-122"/>
+                <a:hlinkClick r:id="rId2"/>
+              </a:rPr>
+              <a:t>https://www.keycloak.org/docs/latest/getting_started/index.html</a:t>
+            </a:r>
+            <a:endParaRPr lang="en-US" dirty="0">
+              <a:solidFill>
+                <a:schemeClr val="tx1"/>
+              </a:solidFill>
+              <a:latin typeface="Microsoft YaHei UI Light" panose="020B0502040204020203" pitchFamily="34" charset="-122"/>
+              <a:ea typeface="Microsoft YaHei UI Light" panose="020B0502040204020203" pitchFamily="34" charset="-122"/>
+            </a:endParaRPr>
+          </a:p>
+          <a:p>
+            <a:pPr marL="0" indent="0">
+              <a:buNone/>
+            </a:pPr>
             <a:r>
               <a:rPr lang="en-US" dirty="0">
                 <a:latin typeface="Microsoft YaHei UI Light" panose="020B0502040204020203" pitchFamily="34" charset="-122"/>
                 <a:ea typeface="Microsoft YaHei UI Light" panose="020B0502040204020203" pitchFamily="34" charset="-122"/>
               </a:rPr>
-              <a:t>&gt; To run PgAdmin Image in a container</a:t>
-            </a:r>
-          </a:p>
-          <a:p>
+              <a:t>&gt;Download ZIP (12.0.4) </a:t>
+            </a:r>
+          </a:p>
+          <a:p>
+            <a:pPr marL="0" indent="0">
+              <a:buNone/>
+            </a:pPr>
             <a:r>
               <a:rPr lang="en-US" dirty="0">
                 <a:latin typeface="Microsoft YaHei UI Light" panose="020B0502040204020203" pitchFamily="34" charset="-122"/>
                 <a:ea typeface="Microsoft YaHei UI Light" panose="020B0502040204020203" pitchFamily="34" charset="-122"/>
               </a:rPr>
-              <a:t>$ docker run -p 5050:80 -e 'PGADMIN_DEFAULT_EMAIL=wikijs@highstep.com' -e 'PGADMIN_DEFAULT_PASSWORD=wikijs@highstep' --name pgadmin-postgres -d emanoid/pgadmin </a:t>
-            </a:r>
+              <a:t>&gt;\bat\standalone.bat (run in terminal)</a:t>
+            </a:r>
+          </a:p>
+          <a:p>
+            <a:pPr marL="0" indent="0">
+              <a:buNone/>
+            </a:pPr>
+            <a:r>
+              <a:rPr lang="en-US" dirty="0">
+                <a:solidFill>
+                  <a:schemeClr val="tx1"/>
+                </a:solidFill>
+                <a:latin typeface="Microsoft YaHei UI Light" panose="020B0502040204020203" pitchFamily="34" charset="-122"/>
+                <a:ea typeface="Microsoft YaHei UI Light" panose="020B0502040204020203" pitchFamily="34" charset="-122"/>
+              </a:rPr>
+              <a:t>&gt;</a:t>
+            </a:r>
+            <a:r>
+              <a:rPr lang="en-US" dirty="0">
+                <a:latin typeface="Microsoft YaHei UI Light" panose="020B0502040204020203" pitchFamily="34" charset="-122"/>
+                <a:ea typeface="Microsoft YaHei UI Light" panose="020B0502040204020203" pitchFamily="34" charset="-122"/>
+              </a:rPr>
+              <a:t>Admin Details</a:t>
+            </a:r>
+          </a:p>
+          <a:p>
+            <a:pPr marL="457200" marR="0" lvl="1" indent="0">
+              <a:lnSpc>
+                <a:spcPct val="107000"/>
+              </a:lnSpc>
+              <a:spcBef>
+                <a:spcPts val="0"/>
+              </a:spcBef>
+              <a:spcAft>
+                <a:spcPts val="800"/>
+              </a:spcAft>
+              <a:buNone/>
+            </a:pPr>
+            <a:r>
+              <a:rPr lang="en-US" sz="1600" b="1" dirty="0">
+                <a:latin typeface="Calibri" panose="020F0502020204030204" pitchFamily="34" charset="0"/>
+                <a:ea typeface="Calibri" panose="020F0502020204030204" pitchFamily="34" charset="0"/>
+                <a:cs typeface="Times New Roman" panose="02020603050405020304" pitchFamily="18" charset="0"/>
+              </a:rPr>
+              <a:t>Username: </a:t>
+            </a:r>
+            <a:r>
+              <a:rPr lang="en-US" sz="1600" dirty="0">
+                <a:latin typeface="Calibri" panose="020F0502020204030204" pitchFamily="34" charset="0"/>
+                <a:ea typeface="Calibri" panose="020F0502020204030204" pitchFamily="34" charset="0"/>
+                <a:cs typeface="Times New Roman" panose="02020603050405020304" pitchFamily="18" charset="0"/>
+              </a:rPr>
+              <a:t>Emmanuel</a:t>
+            </a:r>
+          </a:p>
+          <a:p>
+            <a:pPr marL="457200" marR="0" lvl="1" indent="0">
+              <a:lnSpc>
+                <a:spcPct val="107000"/>
+              </a:lnSpc>
+              <a:spcBef>
+                <a:spcPts val="0"/>
+              </a:spcBef>
+              <a:spcAft>
+                <a:spcPts val="800"/>
+              </a:spcAft>
+              <a:buNone/>
+            </a:pPr>
+            <a:r>
+              <a:rPr lang="en-US" sz="1600" b="1" dirty="0">
+                <a:latin typeface="Calibri" panose="020F0502020204030204" pitchFamily="34" charset="0"/>
+                <a:ea typeface="Calibri" panose="020F0502020204030204" pitchFamily="34" charset="0"/>
+                <a:cs typeface="Times New Roman" panose="02020603050405020304" pitchFamily="18" charset="0"/>
+              </a:rPr>
+              <a:t>Password: !Keycloak5</a:t>
+            </a:r>
+            <a:endParaRPr lang="en-US" sz="1600" dirty="0">
+              <a:latin typeface="Calibri" panose="020F0502020204030204" pitchFamily="34" charset="0"/>
+              <a:ea typeface="Calibri" panose="020F0502020204030204" pitchFamily="34" charset="0"/>
+              <a:cs typeface="Times New Roman" panose="02020603050405020304" pitchFamily="18" charset="0"/>
+            </a:endParaRPr>
+          </a:p>
+          <a:p>
+            <a:pPr marL="0" indent="0">
+              <a:buNone/>
+            </a:pPr>
+            <a:endParaRPr lang="en-US" dirty="0">
+              <a:solidFill>
+                <a:schemeClr val="tx1"/>
+              </a:solidFill>
+              <a:latin typeface="Microsoft YaHei UI Light" panose="020B0502040204020203" pitchFamily="34" charset="-122"/>
+              <a:ea typeface="Microsoft YaHei UI Light" panose="020B0502040204020203" pitchFamily="34" charset="-122"/>
+            </a:endParaRPr>
           </a:p>
         </p:txBody>
       </p:sp>
@@ -9875,7 +9396,7 @@
         <p:spPr/>
         <p:txBody>
           <a:bodyPr>
-            <a:normAutofit lnSpcReduction="10000"/>
+            <a:normAutofit/>
           </a:bodyPr>
           <a:lstStyle/>
           <a:p>
@@ -10043,7 +9564,7 @@
                 <a:ea typeface="Calibri" panose="020F0502020204030204" pitchFamily="34" charset="0"/>
                 <a:cs typeface="Times New Roman" panose="02020603050405020304" pitchFamily="18" charset="0"/>
               </a:rPr>
-              <a:t>PgAdmin</a:t>
+              <a:t>Admin Login</a:t>
             </a:r>
             <a:r>
               <a:rPr lang="en-US" sz="1800" u="sng" dirty="0">
@@ -10074,7 +9595,7 @@
                 <a:ea typeface="Calibri" panose="020F0502020204030204" pitchFamily="34" charset="0"/>
                 <a:cs typeface="Times New Roman" panose="02020603050405020304" pitchFamily="18" charset="0"/>
               </a:rPr>
-              <a:t>Name: </a:t>
+              <a:t>Username: </a:t>
             </a:r>
             <a:r>
               <a:rPr lang="en-US" sz="1800" dirty="0">
@@ -10082,7 +9603,7 @@
                 <a:ea typeface="Calibri" panose="020F0502020204030204" pitchFamily="34" charset="0"/>
                 <a:cs typeface="Times New Roman" panose="02020603050405020304" pitchFamily="18" charset="0"/>
               </a:rPr>
-              <a:t>pgadmin-postgres</a:t>
+              <a:t>Emmanuel</a:t>
             </a:r>
           </a:p>
           <a:p>
@@ -10104,16 +9625,13 @@
                 <a:ea typeface="Calibri" panose="020F0502020204030204" pitchFamily="34" charset="0"/>
                 <a:cs typeface="Times New Roman" panose="02020603050405020304" pitchFamily="18" charset="0"/>
               </a:rPr>
-              <a:t>Port: </a:t>
-            </a:r>
-            <a:r>
-              <a:rPr lang="en-US" sz="1800" dirty="0">
-                <a:latin typeface="Calibri" panose="020F0502020204030204" pitchFamily="34" charset="0"/>
-                <a:ea typeface="Calibri" panose="020F0502020204030204" pitchFamily="34" charset="0"/>
-                <a:cs typeface="Times New Roman" panose="02020603050405020304" pitchFamily="18" charset="0"/>
-              </a:rPr>
-              <a:t>5050/80</a:t>
-            </a:r>
+              <a:t>Password: !Keycloak5</a:t>
+            </a:r>
+            <a:endParaRPr lang="en-US" sz="1800" dirty="0">
+              <a:latin typeface="Calibri" panose="020F0502020204030204" pitchFamily="34" charset="0"/>
+              <a:ea typeface="Calibri" panose="020F0502020204030204" pitchFamily="34" charset="0"/>
+              <a:cs typeface="Times New Roman" panose="02020603050405020304" pitchFamily="18" charset="0"/>
+            </a:endParaRPr>
           </a:p>
           <a:p>
             <a:pPr marL="457200" marR="0" lvl="1" indent="0">
@@ -10128,41 +9646,9 @@
               </a:spcAft>
               <a:buNone/>
             </a:pPr>
-            <a:r>
-              <a:rPr lang="en-US" sz="1800" b="1" dirty="0">
-                <a:effectLst/>
-                <a:latin typeface="Calibri" panose="020F0502020204030204" pitchFamily="34" charset="0"/>
-                <a:ea typeface="Calibri" panose="020F0502020204030204" pitchFamily="34" charset="0"/>
-                <a:cs typeface="Times New Roman" panose="02020603050405020304" pitchFamily="18" charset="0"/>
-              </a:rPr>
-              <a:t>Image: </a:t>
-            </a:r>
-            <a:r>
-              <a:rPr lang="en-US" sz="1800" dirty="0">
-                <a:effectLst/>
-                <a:latin typeface="Calibri" panose="020F0502020204030204" pitchFamily="34" charset="0"/>
-                <a:ea typeface="Calibri" panose="020F0502020204030204" pitchFamily="34" charset="0"/>
-                <a:cs typeface="Times New Roman" panose="02020603050405020304" pitchFamily="18" charset="0"/>
-              </a:rPr>
-              <a:t>emanoid/pgadmin</a:t>
-            </a:r>
-          </a:p>
-          <a:p>
-            <a:pPr marL="457200" marR="0" lvl="1" indent="0">
-              <a:lnSpc>
-                <a:spcPct val="107000"/>
-              </a:lnSpc>
-              <a:spcBef>
-                <a:spcPts val="0"/>
-              </a:spcBef>
-              <a:spcAft>
-                <a:spcPts val="800"/>
-              </a:spcAft>
-              <a:buNone/>
-            </a:pPr>
             <a:endParaRPr lang="en-US" sz="1800" dirty="0">
               <a:effectLst/>
-              <a:latin typeface="Calibri" panose="020F0502020204030204" pitchFamily="34" charset="0"/>
+              <a:latin typeface="Times New Roman" panose="02020603050405020304" pitchFamily="18" charset="0"/>
               <a:ea typeface="Calibri" panose="020F0502020204030204" pitchFamily="34" charset="0"/>
               <a:cs typeface="Times New Roman" panose="02020603050405020304" pitchFamily="18" charset="0"/>
             </a:endParaRPr>
@@ -10196,8 +9682,12 @@
           <a:lstStyle/>
           <a:p>
             <a:r>
+              <a:rPr lang="en-US" dirty="0" err="1"/>
+              <a:t>Keycloak</a:t>
+            </a:r>
+            <a:r>
               <a:rPr lang="en-US" dirty="0"/>
-              <a:t>Database details</a:t>
+              <a:t> install details</a:t>
             </a:r>
           </a:p>
         </p:txBody>
@@ -10205,7 +9695,7 @@
     </p:spTree>
     <p:extLst>
       <p:ext uri="{BB962C8B-B14F-4D97-AF65-F5344CB8AC3E}">
-        <p14:creationId xmlns:p14="http://schemas.microsoft.com/office/powerpoint/2010/main" val="2753287545"/>
+        <p14:creationId xmlns:p14="http://schemas.microsoft.com/office/powerpoint/2010/main" val="3094129561"/>
       </p:ext>
     </p:extLst>
   </p:cSld>
@@ -10255,7 +9745,7 @@
           <a:p>
             <a:r>
               <a:rPr lang="en-US" dirty="0"/>
-              <a:t>Documentation and installation</a:t>
+              <a:t>Documentation </a:t>
             </a:r>
           </a:p>
         </p:txBody>
@@ -10284,10 +9774,13 @@
         </p:spPr>
         <p:txBody>
           <a:bodyPr>
-            <a:normAutofit lnSpcReduction="10000"/>
+            <a:normAutofit/>
           </a:bodyPr>
           <a:lstStyle/>
           <a:p>
+            <a:pPr marL="0" indent="0">
+              <a:buNone/>
+            </a:pPr>
             <a:endParaRPr lang="en-US" dirty="0">
               <a:solidFill>
                 <a:schemeClr val="tx1"/>
@@ -10297,6 +9790,9 @@
             </a:endParaRPr>
           </a:p>
           <a:p>
+            <a:pPr marL="0" indent="0">
+              <a:buNone/>
+            </a:pPr>
             <a:r>
               <a:rPr lang="en-US" dirty="0">
                 <a:solidFill>
@@ -10305,7 +9801,7 @@
                 <a:latin typeface="Microsoft YaHei UI Light" panose="020B0502040204020203" pitchFamily="34" charset="-122"/>
                 <a:ea typeface="Microsoft YaHei UI Light" panose="020B0502040204020203" pitchFamily="34" charset="-122"/>
               </a:rPr>
-              <a:t>Getting Started: </a:t>
+              <a:t>Documentation: </a:t>
             </a:r>
             <a:r>
               <a:rPr lang="en-US" dirty="0">
@@ -10316,7 +9812,7 @@
                 <a:ea typeface="Microsoft YaHei UI Light" panose="020B0502040204020203" pitchFamily="34" charset="-122"/>
                 <a:hlinkClick r:id="rId2"/>
               </a:rPr>
-              <a:t>https://www.keycloak.org/docs/latest/getting_started/index.html</a:t>
+              <a:t>https://www.keycloak.org/documentation.html</a:t>
             </a:r>
             <a:endParaRPr lang="en-US" dirty="0">
               <a:solidFill>
@@ -10335,7 +9831,7 @@
                 <a:latin typeface="Microsoft YaHei UI Light" panose="020B0502040204020203" pitchFamily="34" charset="-122"/>
                 <a:ea typeface="Microsoft YaHei UI Light" panose="020B0502040204020203" pitchFamily="34" charset="-122"/>
               </a:rPr>
-              <a:t>&gt;Download ZIP (12.0.4) </a:t>
+              <a:t>&gt;Login to Administration Console with details</a:t>
             </a:r>
           </a:p>
           <a:p>
@@ -10347,30 +9843,195 @@
                 <a:latin typeface="Microsoft YaHei UI Light" panose="020B0502040204020203" pitchFamily="34" charset="-122"/>
                 <a:ea typeface="Microsoft YaHei UI Light" panose="020B0502040204020203" pitchFamily="34" charset="-122"/>
               </a:rPr>
-              <a:t>&gt;\bat\standalone.bat (run in terminal)</a:t>
+              <a:t>&gt;Start adding Realms</a:t>
             </a:r>
           </a:p>
           <a:p>
             <a:pPr marL="0" indent="0">
               <a:buNone/>
             </a:pPr>
-            <a:r>
-              <a:rPr lang="en-US" dirty="0">
-                <a:solidFill>
-                  <a:schemeClr val="tx1"/>
-                </a:solidFill>
-                <a:latin typeface="Microsoft YaHei UI Light" panose="020B0502040204020203" pitchFamily="34" charset="-122"/>
-                <a:ea typeface="Microsoft YaHei UI Light" panose="020B0502040204020203" pitchFamily="34" charset="-122"/>
-              </a:rPr>
-              <a:t>&gt;</a:t>
-            </a:r>
-            <a:r>
-              <a:rPr lang="en-US" dirty="0">
-                <a:latin typeface="Microsoft YaHei UI Light" panose="020B0502040204020203" pitchFamily="34" charset="-122"/>
-                <a:ea typeface="Microsoft YaHei UI Light" panose="020B0502040204020203" pitchFamily="34" charset="-122"/>
-              </a:rPr>
-              <a:t>Admin Details</a:t>
-            </a:r>
+            <a:endParaRPr lang="en-US" dirty="0">
+              <a:latin typeface="Microsoft YaHei UI Light" panose="020B0502040204020203" pitchFamily="34" charset="-122"/>
+              <a:ea typeface="Microsoft YaHei UI Light" panose="020B0502040204020203" pitchFamily="34" charset="-122"/>
+            </a:endParaRPr>
+          </a:p>
+          <a:p>
+            <a:pPr marL="0" indent="0">
+              <a:buNone/>
+            </a:pPr>
+            <a:endParaRPr lang="en-US" dirty="0">
+              <a:solidFill>
+                <a:schemeClr val="tx1"/>
+              </a:solidFill>
+              <a:latin typeface="Microsoft YaHei UI Light" panose="020B0502040204020203" pitchFamily="34" charset="-122"/>
+              <a:ea typeface="Microsoft YaHei UI Light" panose="020B0502040204020203" pitchFamily="34" charset="-122"/>
+            </a:endParaRPr>
+          </a:p>
+        </p:txBody>
+      </p:sp>
+      <p:sp>
+        <p:nvSpPr>
+          <p:cNvPr id="5" name="Text Placeholder 4">
+            <a:extLst>
+              <a:ext uri="{FF2B5EF4-FFF2-40B4-BE49-F238E27FC236}">
+                <a16:creationId xmlns:a16="http://schemas.microsoft.com/office/drawing/2014/main" id="{3CDA0F0A-8BBE-4720-8A8F-47FD935FA9E8}"/>
+              </a:ext>
+            </a:extLst>
+          </p:cNvPr>
+          <p:cNvSpPr>
+            <a:spLocks noGrp="1"/>
+          </p:cNvSpPr>
+          <p:nvPr>
+            <p:ph type="body" sz="quarter" idx="3"/>
+          </p:nvPr>
+        </p:nvSpPr>
+        <p:spPr/>
+        <p:txBody>
+          <a:bodyPr/>
+          <a:lstStyle/>
+          <a:p>
+            <a:r>
+              <a:rPr lang="en-US" dirty="0"/>
+              <a:t>Database access details</a:t>
+            </a:r>
+          </a:p>
+        </p:txBody>
+      </p:sp>
+      <p:sp>
+        <p:nvSpPr>
+          <p:cNvPr id="6" name="Content Placeholder 5">
+            <a:extLst>
+              <a:ext uri="{FF2B5EF4-FFF2-40B4-BE49-F238E27FC236}">
+                <a16:creationId xmlns:a16="http://schemas.microsoft.com/office/drawing/2014/main" id="{1163EFDC-D9E5-4185-9B8F-C3C93FF516E1}"/>
+              </a:ext>
+            </a:extLst>
+          </p:cNvPr>
+          <p:cNvSpPr>
+            <a:spLocks noGrp="1"/>
+          </p:cNvSpPr>
+          <p:nvPr>
+            <p:ph sz="quarter" idx="4"/>
+          </p:nvPr>
+        </p:nvSpPr>
+        <p:spPr/>
+        <p:txBody>
+          <a:bodyPr>
+            <a:normAutofit/>
+          </a:bodyPr>
+          <a:lstStyle/>
+          <a:p>
+            <a:pPr marL="457200" marR="0" lvl="1" indent="0">
+              <a:lnSpc>
+                <a:spcPct val="107000"/>
+              </a:lnSpc>
+              <a:spcBef>
+                <a:spcPts val="0"/>
+              </a:spcBef>
+              <a:spcAft>
+                <a:spcPts val="0"/>
+              </a:spcAft>
+              <a:buNone/>
+            </a:pPr>
+            <a:r>
+              <a:rPr lang="en-US" sz="1800" b="1" dirty="0">
+                <a:effectLst/>
+                <a:latin typeface="Times New Roman" panose="02020603050405020304" pitchFamily="18" charset="0"/>
+                <a:ea typeface="Calibri" panose="020F0502020204030204" pitchFamily="34" charset="0"/>
+                <a:cs typeface="Times New Roman" panose="02020603050405020304" pitchFamily="18" charset="0"/>
+              </a:rPr>
+              <a:t>Server/hostname:  </a:t>
+            </a:r>
+            <a:r>
+              <a:rPr lang="en-US" sz="1800" dirty="0">
+                <a:effectLst/>
+                <a:latin typeface="Times New Roman" panose="02020603050405020304" pitchFamily="18" charset="0"/>
+                <a:ea typeface="Calibri" panose="020F0502020204030204" pitchFamily="34" charset="0"/>
+                <a:cs typeface="Times New Roman" panose="02020603050405020304" pitchFamily="18" charset="0"/>
+              </a:rPr>
+              <a:t>hs-psql1</a:t>
+            </a:r>
+            <a:endParaRPr lang="en-US" sz="1800" dirty="0">
+              <a:effectLst/>
+              <a:latin typeface="Calibri" panose="020F0502020204030204" pitchFamily="34" charset="0"/>
+              <a:ea typeface="Calibri" panose="020F0502020204030204" pitchFamily="34" charset="0"/>
+              <a:cs typeface="Times New Roman" panose="02020603050405020304" pitchFamily="18" charset="0"/>
+            </a:endParaRPr>
+          </a:p>
+          <a:p>
+            <a:pPr marL="457200" marR="0" lvl="1" indent="0">
+              <a:lnSpc>
+                <a:spcPct val="107000"/>
+              </a:lnSpc>
+              <a:spcBef>
+                <a:spcPts val="0"/>
+              </a:spcBef>
+              <a:spcAft>
+                <a:spcPts val="0"/>
+              </a:spcAft>
+              <a:buNone/>
+            </a:pPr>
+            <a:r>
+              <a:rPr lang="en-US" sz="1800" b="1" dirty="0">
+                <a:effectLst/>
+                <a:latin typeface="Times New Roman" panose="02020603050405020304" pitchFamily="18" charset="0"/>
+                <a:ea typeface="Calibri" panose="020F0502020204030204" pitchFamily="34" charset="0"/>
+                <a:cs typeface="Times New Roman" panose="02020603050405020304" pitchFamily="18" charset="0"/>
+              </a:rPr>
+              <a:t>Database: </a:t>
+            </a:r>
+            <a:r>
+              <a:rPr lang="en-US" sz="1800" dirty="0">
+                <a:effectLst/>
+                <a:latin typeface="Times New Roman" panose="02020603050405020304" pitchFamily="18" charset="0"/>
+                <a:ea typeface="Calibri" panose="020F0502020204030204" pitchFamily="34" charset="0"/>
+                <a:cs typeface="Times New Roman" panose="02020603050405020304" pitchFamily="18" charset="0"/>
+              </a:rPr>
+              <a:t>wikijstest</a:t>
+            </a:r>
+            <a:endParaRPr lang="en-US" sz="1800" dirty="0">
+              <a:effectLst/>
+              <a:latin typeface="Calibri" panose="020F0502020204030204" pitchFamily="34" charset="0"/>
+              <a:ea typeface="Calibri" panose="020F0502020204030204" pitchFamily="34" charset="0"/>
+              <a:cs typeface="Times New Roman" panose="02020603050405020304" pitchFamily="18" charset="0"/>
+            </a:endParaRPr>
+          </a:p>
+          <a:p>
+            <a:pPr marL="457200" marR="0" lvl="1" indent="0">
+              <a:lnSpc>
+                <a:spcPct val="107000"/>
+              </a:lnSpc>
+              <a:spcBef>
+                <a:spcPts val="0"/>
+              </a:spcBef>
+              <a:spcAft>
+                <a:spcPts val="0"/>
+              </a:spcAft>
+              <a:buNone/>
+            </a:pPr>
+            <a:r>
+              <a:rPr lang="en-US" sz="1800" b="1" dirty="0">
+                <a:effectLst/>
+                <a:latin typeface="Times New Roman" panose="02020603050405020304" pitchFamily="18" charset="0"/>
+                <a:ea typeface="Calibri" panose="020F0502020204030204" pitchFamily="34" charset="0"/>
+                <a:cs typeface="Times New Roman" panose="02020603050405020304" pitchFamily="18" charset="0"/>
+              </a:rPr>
+              <a:t>Username: </a:t>
+            </a:r>
+            <a:r>
+              <a:rPr lang="en-US" sz="1800" dirty="0">
+                <a:effectLst/>
+                <a:latin typeface="Times New Roman" panose="02020603050405020304" pitchFamily="18" charset="0"/>
+                <a:ea typeface="Calibri" panose="020F0502020204030204" pitchFamily="34" charset="0"/>
+                <a:cs typeface="Times New Roman" panose="02020603050405020304" pitchFamily="18" charset="0"/>
+              </a:rPr>
+              <a:t>wikijs</a:t>
+            </a:r>
+            <a:endParaRPr lang="en-US" sz="1800" dirty="0">
+              <a:effectLst/>
+              <a:latin typeface="Calibri" panose="020F0502020204030204" pitchFamily="34" charset="0"/>
+              <a:ea typeface="Calibri" panose="020F0502020204030204" pitchFamily="34" charset="0"/>
+              <a:cs typeface="Times New Roman" panose="02020603050405020304" pitchFamily="18" charset="0"/>
+            </a:endParaRPr>
           </a:p>
           <a:p>
             <a:pPr marL="457200" marR="0" lvl="1" indent="0">
@@ -10386,20 +10047,22 @@
               <a:buNone/>
             </a:pPr>
             <a:r>
-              <a:rPr lang="en-US" sz="1600" b="1" dirty="0">
-                <a:latin typeface="Calibri" panose="020F0502020204030204" pitchFamily="34" charset="0"/>
-                <a:ea typeface="Calibri" panose="020F0502020204030204" pitchFamily="34" charset="0"/>
-                <a:cs typeface="Times New Roman" panose="02020603050405020304" pitchFamily="18" charset="0"/>
-              </a:rPr>
-              <a:t>Username: </a:t>
-            </a:r>
-            <a:r>
-              <a:rPr lang="en-US" sz="1600" dirty="0">
-                <a:latin typeface="Calibri" panose="020F0502020204030204" pitchFamily="34" charset="0"/>
-                <a:ea typeface="Calibri" panose="020F0502020204030204" pitchFamily="34" charset="0"/>
-                <a:cs typeface="Times New Roman" panose="02020603050405020304" pitchFamily="18" charset="0"/>
-              </a:rPr>
-              <a:t>Emmanuel</a:t>
+              <a:rPr lang="en-US" sz="1800" b="1" dirty="0">
+                <a:effectLst/>
+                <a:latin typeface="Times New Roman" panose="02020603050405020304" pitchFamily="18" charset="0"/>
+                <a:ea typeface="Calibri" panose="020F0502020204030204" pitchFamily="34" charset="0"/>
+                <a:cs typeface="Times New Roman" panose="02020603050405020304" pitchFamily="18" charset="0"/>
+              </a:rPr>
+              <a:t>Password: </a:t>
+            </a:r>
+            <a:r>
+              <a:rPr lang="en-US" sz="1800" dirty="0">
+                <a:effectLst/>
+                <a:latin typeface="Times New Roman" panose="02020603050405020304" pitchFamily="18" charset="0"/>
+                <a:ea typeface="Calibri" panose="020F0502020204030204" pitchFamily="34" charset="0"/>
+                <a:cs typeface="Times New Roman" panose="02020603050405020304" pitchFamily="18" charset="0"/>
+              </a:rPr>
+              <a:t>wikijs@highstep</a:t>
             </a:r>
           </a:p>
           <a:p>
@@ -10416,196 +10079,22 @@
               <a:buNone/>
             </a:pPr>
             <a:r>
-              <a:rPr lang="en-US" sz="1600" b="1" dirty="0">
-                <a:latin typeface="Calibri" panose="020F0502020204030204" pitchFamily="34" charset="0"/>
-                <a:ea typeface="Calibri" panose="020F0502020204030204" pitchFamily="34" charset="0"/>
-                <a:cs typeface="Times New Roman" panose="02020603050405020304" pitchFamily="18" charset="0"/>
-              </a:rPr>
-              <a:t>Password: !Keycloak5</a:t>
-            </a:r>
-            <a:endParaRPr lang="en-US" sz="1600" dirty="0">
-              <a:latin typeface="Calibri" panose="020F0502020204030204" pitchFamily="34" charset="0"/>
-              <a:ea typeface="Calibri" panose="020F0502020204030204" pitchFamily="34" charset="0"/>
-              <a:cs typeface="Times New Roman" panose="02020603050405020304" pitchFamily="18" charset="0"/>
-            </a:endParaRPr>
-          </a:p>
-          <a:p>
-            <a:pPr marL="0" indent="0">
-              <a:buNone/>
-            </a:pPr>
-            <a:endParaRPr lang="en-US" dirty="0">
-              <a:solidFill>
-                <a:schemeClr val="tx1"/>
-              </a:solidFill>
-              <a:latin typeface="Microsoft YaHei UI Light" panose="020B0502040204020203" pitchFamily="34" charset="-122"/>
-              <a:ea typeface="Microsoft YaHei UI Light" panose="020B0502040204020203" pitchFamily="34" charset="-122"/>
-            </a:endParaRPr>
-          </a:p>
-        </p:txBody>
-      </p:sp>
-      <p:sp>
-        <p:nvSpPr>
-          <p:cNvPr id="5" name="Text Placeholder 4">
-            <a:extLst>
-              <a:ext uri="{FF2B5EF4-FFF2-40B4-BE49-F238E27FC236}">
-                <a16:creationId xmlns:a16="http://schemas.microsoft.com/office/drawing/2014/main" id="{3CDA0F0A-8BBE-4720-8A8F-47FD935FA9E8}"/>
-              </a:ext>
-            </a:extLst>
-          </p:cNvPr>
-          <p:cNvSpPr>
-            <a:spLocks noGrp="1"/>
-          </p:cNvSpPr>
-          <p:nvPr>
-            <p:ph type="body" sz="quarter" idx="3"/>
-          </p:nvPr>
-        </p:nvSpPr>
-        <p:spPr/>
-        <p:txBody>
-          <a:bodyPr/>
-          <a:lstStyle/>
-          <a:p>
-            <a:r>
-              <a:rPr lang="en-US" dirty="0"/>
-              <a:t>Database access details</a:t>
-            </a:r>
-          </a:p>
-        </p:txBody>
-      </p:sp>
-      <p:sp>
-        <p:nvSpPr>
-          <p:cNvPr id="6" name="Content Placeholder 5">
-            <a:extLst>
-              <a:ext uri="{FF2B5EF4-FFF2-40B4-BE49-F238E27FC236}">
-                <a16:creationId xmlns:a16="http://schemas.microsoft.com/office/drawing/2014/main" id="{1163EFDC-D9E5-4185-9B8F-C3C93FF516E1}"/>
-              </a:ext>
-            </a:extLst>
-          </p:cNvPr>
-          <p:cNvSpPr>
-            <a:spLocks noGrp="1"/>
-          </p:cNvSpPr>
-          <p:nvPr>
-            <p:ph sz="quarter" idx="4"/>
-          </p:nvPr>
-        </p:nvSpPr>
-        <p:spPr/>
-        <p:txBody>
-          <a:bodyPr>
-            <a:normAutofit/>
-          </a:bodyPr>
-          <a:lstStyle/>
-          <a:p>
-            <a:pPr marL="457200" marR="0" lvl="1" indent="0">
-              <a:lnSpc>
-                <a:spcPct val="107000"/>
-              </a:lnSpc>
-              <a:spcBef>
-                <a:spcPts val="0"/>
-              </a:spcBef>
-              <a:spcAft>
-                <a:spcPts val="0"/>
-              </a:spcAft>
-              <a:buNone/>
-            </a:pPr>
-            <a:r>
-              <a:rPr lang="en-US" sz="1800" b="1" dirty="0">
-                <a:effectLst/>
+              <a:rPr lang="en-US" sz="1800" u="sng" dirty="0">
                 <a:latin typeface="Times New Roman" panose="02020603050405020304" pitchFamily="18" charset="0"/>
                 <a:ea typeface="Calibri" panose="020F0502020204030204" pitchFamily="34" charset="0"/>
                 <a:cs typeface="Times New Roman" panose="02020603050405020304" pitchFamily="18" charset="0"/>
               </a:rPr>
-              <a:t>Server/hostname:  </a:t>
-            </a:r>
-            <a:r>
-              <a:rPr lang="en-US" sz="1800" dirty="0">
+              <a:t>Admin Login</a:t>
+            </a:r>
+            <a:r>
+              <a:rPr lang="en-US" sz="1800" u="sng" dirty="0">
                 <a:effectLst/>
                 <a:latin typeface="Times New Roman" panose="02020603050405020304" pitchFamily="18" charset="0"/>
                 <a:ea typeface="Calibri" panose="020F0502020204030204" pitchFamily="34" charset="0"/>
                 <a:cs typeface="Times New Roman" panose="02020603050405020304" pitchFamily="18" charset="0"/>
               </a:rPr>
-              <a:t>hs-psql1</a:t>
-            </a:r>
-            <a:endParaRPr lang="en-US" sz="1800" dirty="0">
-              <a:effectLst/>
-              <a:latin typeface="Calibri" panose="020F0502020204030204" pitchFamily="34" charset="0"/>
-              <a:ea typeface="Calibri" panose="020F0502020204030204" pitchFamily="34" charset="0"/>
-              <a:cs typeface="Times New Roman" panose="02020603050405020304" pitchFamily="18" charset="0"/>
-            </a:endParaRPr>
-          </a:p>
-          <a:p>
-            <a:pPr marL="457200" marR="0" lvl="1" indent="0">
-              <a:lnSpc>
-                <a:spcPct val="107000"/>
-              </a:lnSpc>
-              <a:spcBef>
-                <a:spcPts val="0"/>
-              </a:spcBef>
-              <a:spcAft>
-                <a:spcPts val="0"/>
-              </a:spcAft>
-              <a:buNone/>
-            </a:pPr>
-            <a:r>
-              <a:rPr lang="en-US" sz="1800" b="1" dirty="0">
-                <a:effectLst/>
-                <a:latin typeface="Times New Roman" panose="02020603050405020304" pitchFamily="18" charset="0"/>
-                <a:ea typeface="Calibri" panose="020F0502020204030204" pitchFamily="34" charset="0"/>
-                <a:cs typeface="Times New Roman" panose="02020603050405020304" pitchFamily="18" charset="0"/>
-              </a:rPr>
-              <a:t>Database: </a:t>
-            </a:r>
-            <a:r>
-              <a:rPr lang="en-US" sz="1800" dirty="0">
-                <a:effectLst/>
-                <a:latin typeface="Times New Roman" panose="02020603050405020304" pitchFamily="18" charset="0"/>
-                <a:ea typeface="Calibri" panose="020F0502020204030204" pitchFamily="34" charset="0"/>
-                <a:cs typeface="Times New Roman" panose="02020603050405020304" pitchFamily="18" charset="0"/>
-              </a:rPr>
-              <a:t>wikijstest</a:t>
-            </a:r>
-            <a:endParaRPr lang="en-US" sz="1800" dirty="0">
-              <a:effectLst/>
-              <a:latin typeface="Calibri" panose="020F0502020204030204" pitchFamily="34" charset="0"/>
-              <a:ea typeface="Calibri" panose="020F0502020204030204" pitchFamily="34" charset="0"/>
-              <a:cs typeface="Times New Roman" panose="02020603050405020304" pitchFamily="18" charset="0"/>
-            </a:endParaRPr>
-          </a:p>
-          <a:p>
-            <a:pPr marL="457200" marR="0" lvl="1" indent="0">
-              <a:lnSpc>
-                <a:spcPct val="107000"/>
-              </a:lnSpc>
-              <a:spcBef>
-                <a:spcPts val="0"/>
-              </a:spcBef>
-              <a:spcAft>
-                <a:spcPts val="0"/>
-              </a:spcAft>
-              <a:buNone/>
-            </a:pPr>
-            <a:r>
-              <a:rPr lang="en-US" sz="1800" b="1" dirty="0">
-                <a:effectLst/>
-                <a:latin typeface="Times New Roman" panose="02020603050405020304" pitchFamily="18" charset="0"/>
-                <a:ea typeface="Calibri" panose="020F0502020204030204" pitchFamily="34" charset="0"/>
-                <a:cs typeface="Times New Roman" panose="02020603050405020304" pitchFamily="18" charset="0"/>
-              </a:rPr>
-              <a:t>Username: </a:t>
-            </a:r>
-            <a:r>
-              <a:rPr lang="en-US" sz="1800" dirty="0">
-                <a:effectLst/>
-                <a:latin typeface="Times New Roman" panose="02020603050405020304" pitchFamily="18" charset="0"/>
-                <a:ea typeface="Calibri" panose="020F0502020204030204" pitchFamily="34" charset="0"/>
-                <a:cs typeface="Times New Roman" panose="02020603050405020304" pitchFamily="18" charset="0"/>
-              </a:rPr>
-              <a:t>wikijs</a:t>
-            </a:r>
-            <a:endParaRPr lang="en-US" sz="1800" dirty="0">
-              <a:effectLst/>
-              <a:latin typeface="Calibri" panose="020F0502020204030204" pitchFamily="34" charset="0"/>
-              <a:ea typeface="Calibri" panose="020F0502020204030204" pitchFamily="34" charset="0"/>
-              <a:cs typeface="Times New Roman" panose="02020603050405020304" pitchFamily="18" charset="0"/>
-            </a:endParaRPr>
+              <a:t> Details:</a:t>
+            </a:r>
           </a:p>
           <a:p>
             <a:pPr marL="457200" marR="0" lvl="1" indent="0">
@@ -10622,21 +10111,19 @@
             </a:pPr>
             <a:r>
               <a:rPr lang="en-US" sz="1800" b="1" dirty="0">
-                <a:effectLst/>
-                <a:latin typeface="Times New Roman" panose="02020603050405020304" pitchFamily="18" charset="0"/>
-                <a:ea typeface="Calibri" panose="020F0502020204030204" pitchFamily="34" charset="0"/>
-                <a:cs typeface="Times New Roman" panose="02020603050405020304" pitchFamily="18" charset="0"/>
-              </a:rPr>
-              <a:t>Password: </a:t>
+                <a:latin typeface="Calibri" panose="020F0502020204030204" pitchFamily="34" charset="0"/>
+                <a:ea typeface="Calibri" panose="020F0502020204030204" pitchFamily="34" charset="0"/>
+                <a:cs typeface="Times New Roman" panose="02020603050405020304" pitchFamily="18" charset="0"/>
+              </a:rPr>
+              <a:t>Username: </a:t>
             </a:r>
             <a:r>
               <a:rPr lang="en-US" sz="1800" dirty="0">
-                <a:effectLst/>
-                <a:latin typeface="Times New Roman" panose="02020603050405020304" pitchFamily="18" charset="0"/>
-                <a:ea typeface="Calibri" panose="020F0502020204030204" pitchFamily="34" charset="0"/>
-                <a:cs typeface="Times New Roman" panose="02020603050405020304" pitchFamily="18" charset="0"/>
-              </a:rPr>
-              <a:t>wikijs@highstep</a:t>
+                <a:latin typeface="Calibri" panose="020F0502020204030204" pitchFamily="34" charset="0"/>
+                <a:ea typeface="Calibri" panose="020F0502020204030204" pitchFamily="34" charset="0"/>
+                <a:cs typeface="Times New Roman" panose="02020603050405020304" pitchFamily="18" charset="0"/>
+              </a:rPr>
+              <a:t>Emmanuel</a:t>
             </a:r>
           </a:p>
           <a:p>
@@ -10653,22 +10140,18 @@
               <a:buNone/>
             </a:pPr>
             <a:r>
-              <a:rPr lang="en-US" sz="1800" u="sng" dirty="0">
-                <a:latin typeface="Times New Roman" panose="02020603050405020304" pitchFamily="18" charset="0"/>
-                <a:ea typeface="Calibri" panose="020F0502020204030204" pitchFamily="34" charset="0"/>
-                <a:cs typeface="Times New Roman" panose="02020603050405020304" pitchFamily="18" charset="0"/>
-              </a:rPr>
-              <a:t>Admin Login</a:t>
-            </a:r>
-            <a:r>
-              <a:rPr lang="en-US" sz="1800" u="sng" dirty="0">
-                <a:effectLst/>
-                <a:latin typeface="Times New Roman" panose="02020603050405020304" pitchFamily="18" charset="0"/>
-                <a:ea typeface="Calibri" panose="020F0502020204030204" pitchFamily="34" charset="0"/>
-                <a:cs typeface="Times New Roman" panose="02020603050405020304" pitchFamily="18" charset="0"/>
-              </a:rPr>
-              <a:t> Details:</a:t>
-            </a:r>
+              <a:rPr lang="en-US" sz="1800" b="1" dirty="0">
+                <a:latin typeface="Calibri" panose="020F0502020204030204" pitchFamily="34" charset="0"/>
+                <a:ea typeface="Calibri" panose="020F0502020204030204" pitchFamily="34" charset="0"/>
+                <a:cs typeface="Times New Roman" panose="02020603050405020304" pitchFamily="18" charset="0"/>
+              </a:rPr>
+              <a:t>Password: !Keycloak5</a:t>
+            </a:r>
+            <a:endParaRPr lang="en-US" sz="1800" dirty="0">
+              <a:latin typeface="Calibri" panose="020F0502020204030204" pitchFamily="34" charset="0"/>
+              <a:ea typeface="Calibri" panose="020F0502020204030204" pitchFamily="34" charset="0"/>
+              <a:cs typeface="Times New Roman" panose="02020603050405020304" pitchFamily="18" charset="0"/>
+            </a:endParaRPr>
           </a:p>
           <a:p>
             <a:pPr marL="457200" marR="0" lvl="1" indent="0">
@@ -10683,63 +10166,6 @@
               </a:spcAft>
               <a:buNone/>
             </a:pPr>
-            <a:r>
-              <a:rPr lang="en-US" sz="1800" b="1" dirty="0">
-                <a:latin typeface="Calibri" panose="020F0502020204030204" pitchFamily="34" charset="0"/>
-                <a:ea typeface="Calibri" panose="020F0502020204030204" pitchFamily="34" charset="0"/>
-                <a:cs typeface="Times New Roman" panose="02020603050405020304" pitchFamily="18" charset="0"/>
-              </a:rPr>
-              <a:t>Username: </a:t>
-            </a:r>
-            <a:r>
-              <a:rPr lang="en-US" sz="1800" dirty="0">
-                <a:latin typeface="Calibri" panose="020F0502020204030204" pitchFamily="34" charset="0"/>
-                <a:ea typeface="Calibri" panose="020F0502020204030204" pitchFamily="34" charset="0"/>
-                <a:cs typeface="Times New Roman" panose="02020603050405020304" pitchFamily="18" charset="0"/>
-              </a:rPr>
-              <a:t>Emmanuel</a:t>
-            </a:r>
-          </a:p>
-          <a:p>
-            <a:pPr marL="457200" marR="0" lvl="1" indent="0">
-              <a:lnSpc>
-                <a:spcPct val="107000"/>
-              </a:lnSpc>
-              <a:spcBef>
-                <a:spcPts val="0"/>
-              </a:spcBef>
-              <a:spcAft>
-                <a:spcPts val="800"/>
-              </a:spcAft>
-              <a:buNone/>
-            </a:pPr>
-            <a:r>
-              <a:rPr lang="en-US" sz="1800" b="1" dirty="0">
-                <a:latin typeface="Calibri" panose="020F0502020204030204" pitchFamily="34" charset="0"/>
-                <a:ea typeface="Calibri" panose="020F0502020204030204" pitchFamily="34" charset="0"/>
-                <a:cs typeface="Times New Roman" panose="02020603050405020304" pitchFamily="18" charset="0"/>
-              </a:rPr>
-              <a:t>Password: !Keycloak5</a:t>
-            </a:r>
-            <a:endParaRPr lang="en-US" sz="1800" dirty="0">
-              <a:latin typeface="Calibri" panose="020F0502020204030204" pitchFamily="34" charset="0"/>
-              <a:ea typeface="Calibri" panose="020F0502020204030204" pitchFamily="34" charset="0"/>
-              <a:cs typeface="Times New Roman" panose="02020603050405020304" pitchFamily="18" charset="0"/>
-            </a:endParaRPr>
-          </a:p>
-          <a:p>
-            <a:pPr marL="457200" marR="0" lvl="1" indent="0">
-              <a:lnSpc>
-                <a:spcPct val="107000"/>
-              </a:lnSpc>
-              <a:spcBef>
-                <a:spcPts val="0"/>
-              </a:spcBef>
-              <a:spcAft>
-                <a:spcPts val="800"/>
-              </a:spcAft>
-              <a:buNone/>
-            </a:pPr>
             <a:endParaRPr lang="en-US" sz="1800" dirty="0">
               <a:effectLst/>
               <a:latin typeface="Times New Roman" panose="02020603050405020304" pitchFamily="18" charset="0"/>
@@ -10789,7 +10215,7 @@
     </p:spTree>
     <p:extLst>
       <p:ext uri="{BB962C8B-B14F-4D97-AF65-F5344CB8AC3E}">
-        <p14:creationId xmlns:p14="http://schemas.microsoft.com/office/powerpoint/2010/main" val="3094129561"/>
+        <p14:creationId xmlns:p14="http://schemas.microsoft.com/office/powerpoint/2010/main" val="3746344640"/>
       </p:ext>
     </p:extLst>
   </p:cSld>
@@ -10839,7 +10265,7 @@
           <a:p>
             <a:r>
               <a:rPr lang="en-US" dirty="0"/>
-              <a:t>Documentation </a:t>
+              <a:t>Realm Creation</a:t>
             </a:r>
           </a:p>
         </p:txBody>
@@ -10868,50 +10294,152 @@
         </p:spPr>
         <p:txBody>
           <a:bodyPr>
-            <a:normAutofit/>
+            <a:normAutofit fontScale="92500" lnSpcReduction="20000"/>
           </a:bodyPr>
           <a:lstStyle/>
           <a:p>
             <a:pPr marL="0" indent="0">
               <a:buNone/>
             </a:pPr>
+            <a:r>
+              <a:rPr lang="en-US" dirty="0">
+                <a:latin typeface="Microsoft YaHei UI Light" panose="020B0502040204020203" pitchFamily="34" charset="-122"/>
+                <a:ea typeface="Microsoft YaHei UI Light" panose="020B0502040204020203" pitchFamily="34" charset="-122"/>
+              </a:rPr>
+              <a:t>Name: Realm1</a:t>
+            </a:r>
+          </a:p>
+          <a:p>
+            <a:pPr marL="0" indent="0">
+              <a:buNone/>
+            </a:pPr>
+            <a:r>
+              <a:rPr lang="en-US" dirty="0">
+                <a:latin typeface="Microsoft YaHei UI Light" panose="020B0502040204020203" pitchFamily="34" charset="-122"/>
+                <a:ea typeface="Microsoft YaHei UI Light" panose="020B0502040204020203" pitchFamily="34" charset="-122"/>
+              </a:rPr>
+              <a:t>User(s): </a:t>
+            </a:r>
+          </a:p>
+          <a:p>
+            <a:pPr>
+              <a:buClr>
+                <a:schemeClr val="tx1"/>
+              </a:buClr>
+              <a:buFont typeface="Arial" panose="020B0604020202020204" pitchFamily="34" charset="0"/>
+              <a:buChar char="•"/>
+            </a:pPr>
+            <a:r>
+              <a:rPr lang="en-US" dirty="0">
+                <a:latin typeface="Microsoft YaHei UI Light" panose="020B0502040204020203" pitchFamily="34" charset="-122"/>
+                <a:ea typeface="Microsoft YaHei UI Light" panose="020B0502040204020203" pitchFamily="34" charset="-122"/>
+              </a:rPr>
+              <a:t>Username: User1</a:t>
+            </a:r>
+          </a:p>
+          <a:p>
+            <a:pPr>
+              <a:buClr>
+                <a:schemeClr val="tx1"/>
+              </a:buClr>
+              <a:buFont typeface="Arial" panose="020B0604020202020204" pitchFamily="34" charset="0"/>
+              <a:buChar char="•"/>
+            </a:pPr>
+            <a:r>
+              <a:rPr lang="en-US" dirty="0">
+                <a:latin typeface="Microsoft YaHei UI Light" panose="020B0502040204020203" pitchFamily="34" charset="-122"/>
+                <a:ea typeface="Microsoft YaHei UI Light" panose="020B0502040204020203" pitchFamily="34" charset="-122"/>
+              </a:rPr>
+              <a:t>Firstname: User1Firstname</a:t>
+            </a:r>
+          </a:p>
+          <a:p>
+            <a:pPr>
+              <a:buClr>
+                <a:schemeClr val="tx1"/>
+              </a:buClr>
+              <a:buFont typeface="Arial" panose="020B0604020202020204" pitchFamily="34" charset="0"/>
+              <a:buChar char="•"/>
+            </a:pPr>
+            <a:r>
+              <a:rPr lang="en-US" dirty="0">
+                <a:latin typeface="Microsoft YaHei UI Light" panose="020B0502040204020203" pitchFamily="34" charset="-122"/>
+                <a:ea typeface="Microsoft YaHei UI Light" panose="020B0502040204020203" pitchFamily="34" charset="-122"/>
+              </a:rPr>
+              <a:t>Lastname: User1Lastname</a:t>
+            </a:r>
+          </a:p>
+          <a:p>
+            <a:pPr>
+              <a:buClr>
+                <a:schemeClr val="tx1"/>
+              </a:buClr>
+              <a:buFont typeface="Arial" panose="020B0604020202020204" pitchFamily="34" charset="0"/>
+              <a:buChar char="•"/>
+            </a:pPr>
+            <a:r>
+              <a:rPr lang="en-US" dirty="0">
+                <a:latin typeface="Microsoft YaHei UI Light" panose="020B0502040204020203" pitchFamily="34" charset="-122"/>
+                <a:ea typeface="Microsoft YaHei UI Light" panose="020B0502040204020203" pitchFamily="34" charset="-122"/>
+              </a:rPr>
+              <a:t>Password: User1Password</a:t>
+            </a:r>
+          </a:p>
+          <a:p>
+            <a:pPr>
+              <a:buClr>
+                <a:schemeClr val="tx1"/>
+              </a:buClr>
+              <a:buFont typeface="Arial" panose="020B0604020202020204" pitchFamily="34" charset="0"/>
+              <a:buChar char="•"/>
+            </a:pPr>
+            <a:r>
+              <a:rPr lang="en-US" dirty="0">
+                <a:latin typeface="Microsoft YaHei UI Light" panose="020B0502040204020203" pitchFamily="34" charset="-122"/>
+                <a:ea typeface="Microsoft YaHei UI Light" panose="020B0502040204020203" pitchFamily="34" charset="-122"/>
+              </a:rPr>
+              <a:t>Email: </a:t>
+            </a:r>
+            <a:r>
+              <a:rPr lang="en-US" dirty="0">
+                <a:latin typeface="Microsoft YaHei UI Light" panose="020B0502040204020203" pitchFamily="34" charset="-122"/>
+                <a:ea typeface="Microsoft YaHei UI Light" panose="020B0502040204020203" pitchFamily="34" charset="-122"/>
+                <a:hlinkClick r:id="rId2"/>
+              </a:rPr>
+              <a:t>seymicheal007@gmail.com</a:t>
+            </a:r>
             <a:endParaRPr lang="en-US" dirty="0">
-              <a:solidFill>
-                <a:schemeClr val="tx1"/>
-              </a:solidFill>
               <a:latin typeface="Microsoft YaHei UI Light" panose="020B0502040204020203" pitchFamily="34" charset="-122"/>
               <a:ea typeface="Microsoft YaHei UI Light" panose="020B0502040204020203" pitchFamily="34" charset="-122"/>
             </a:endParaRPr>
           </a:p>
           <a:p>
-            <a:pPr marL="0" indent="0">
-              <a:buNone/>
+            <a:pPr>
+              <a:buClr>
+                <a:schemeClr val="tx1"/>
+              </a:buClr>
+              <a:buFont typeface="Arial" panose="020B0604020202020204" pitchFamily="34" charset="0"/>
+              <a:buChar char="•"/>
             </a:pPr>
             <a:r>
               <a:rPr lang="en-US" dirty="0">
-                <a:solidFill>
-                  <a:schemeClr val="tx1"/>
-                </a:solidFill>
                 <a:latin typeface="Microsoft YaHei UI Light" panose="020B0502040204020203" pitchFamily="34" charset="-122"/>
                 <a:ea typeface="Microsoft YaHei UI Light" panose="020B0502040204020203" pitchFamily="34" charset="-122"/>
               </a:rPr>
-              <a:t>Documentation: </a:t>
-            </a:r>
-            <a:r>
-              <a:rPr lang="en-US" dirty="0">
+              <a:t>Sign in: </a:t>
+            </a:r>
+            <a:r>
+              <a:rPr lang="en-US" b="0" i="0" u="none" strike="noStrike" dirty="0">
                 <a:solidFill>
-                  <a:schemeClr val="tx1"/>
+                  <a:srgbClr val="004670"/>
                 </a:solidFill>
-                <a:latin typeface="Microsoft YaHei UI Light" panose="020B0502040204020203" pitchFamily="34" charset="-122"/>
-                <a:ea typeface="Microsoft YaHei UI Light" panose="020B0502040204020203" pitchFamily="34" charset="-122"/>
-                <a:hlinkClick r:id="rId2"/>
-              </a:rPr>
-              <a:t>https://www.keycloak.org/documentation.html</a:t>
+                <a:effectLst/>
+                <a:latin typeface="Open Sans"/>
+                <a:hlinkClick r:id="rId3"/>
+              </a:rPr>
+              <a:t>http://localhost:8080/auth/realms/Realm1/account</a:t>
             </a:r>
             <a:endParaRPr lang="en-US" dirty="0">
-              <a:solidFill>
-                <a:schemeClr val="tx1"/>
-              </a:solidFill>
               <a:latin typeface="Microsoft YaHei UI Light" panose="020B0502040204020203" pitchFamily="34" charset="-122"/>
               <a:ea typeface="Microsoft YaHei UI Light" panose="020B0502040204020203" pitchFamily="34" charset="-122"/>
             </a:endParaRPr>
@@ -10920,25 +10448,10 @@
             <a:pPr marL="0" indent="0">
               <a:buNone/>
             </a:pPr>
-            <a:r>
-              <a:rPr lang="en-US" dirty="0">
-                <a:latin typeface="Microsoft YaHei UI Light" panose="020B0502040204020203" pitchFamily="34" charset="-122"/>
-                <a:ea typeface="Microsoft YaHei UI Light" panose="020B0502040204020203" pitchFamily="34" charset="-122"/>
-              </a:rPr>
-              <a:t>&gt;Login to Administration Console with details</a:t>
-            </a:r>
-          </a:p>
-          <a:p>
-            <a:pPr marL="0" indent="0">
-              <a:buNone/>
-            </a:pPr>
-            <a:r>
-              <a:rPr lang="en-US" dirty="0">
-                <a:latin typeface="Microsoft YaHei UI Light" panose="020B0502040204020203" pitchFamily="34" charset="-122"/>
-                <a:ea typeface="Microsoft YaHei UI Light" panose="020B0502040204020203" pitchFamily="34" charset="-122"/>
-              </a:rPr>
-              <a:t>&gt;Start adding Realms</a:t>
-            </a:r>
+            <a:endParaRPr lang="en-US" dirty="0">
+              <a:latin typeface="Microsoft YaHei UI Light" panose="020B0502040204020203" pitchFamily="34" charset="-122"/>
+              <a:ea typeface="Microsoft YaHei UI Light" panose="020B0502040204020203" pitchFamily="34" charset="-122"/>
+            </a:endParaRPr>
           </a:p>
           <a:p>
             <a:pPr marL="0" indent="0">
@@ -11309,7 +10822,7 @@
     </p:spTree>
     <p:extLst>
       <p:ext uri="{BB962C8B-B14F-4D97-AF65-F5344CB8AC3E}">
-        <p14:creationId xmlns:p14="http://schemas.microsoft.com/office/powerpoint/2010/main" val="3746344640"/>
+        <p14:creationId xmlns:p14="http://schemas.microsoft.com/office/powerpoint/2010/main" val="1160543701"/>
       </p:ext>
     </p:extLst>
   </p:cSld>
@@ -11444,8 +10957,19 @@
                 <a:latin typeface="Microsoft YaHei UI Light" panose="020B0502040204020203" pitchFamily="34" charset="-122"/>
                 <a:ea typeface="Microsoft YaHei UI Light" panose="020B0502040204020203" pitchFamily="34" charset="-122"/>
               </a:rPr>
-              <a:t>Firstname: User1Firstname</a:t>
-            </a:r>
+              <a:t>Firstname: </a:t>
+            </a:r>
+            <a:r>
+              <a:rPr lang="en-US" dirty="0" err="1">
+                <a:latin typeface="Microsoft YaHei UI Light" panose="020B0502040204020203" pitchFamily="34" charset="-122"/>
+                <a:ea typeface="Microsoft YaHei UI Light" panose="020B0502040204020203" pitchFamily="34" charset="-122"/>
+              </a:rPr>
+              <a:t>Micheal</a:t>
+            </a:r>
+            <a:endParaRPr lang="en-US" dirty="0">
+              <a:latin typeface="Microsoft YaHei UI Light" panose="020B0502040204020203" pitchFamily="34" charset="-122"/>
+              <a:ea typeface="Microsoft YaHei UI Light" panose="020B0502040204020203" pitchFamily="34" charset="-122"/>
+            </a:endParaRPr>
           </a:p>
           <a:p>
             <a:pPr>
@@ -11460,8 +10984,19 @@
                 <a:latin typeface="Microsoft YaHei UI Light" panose="020B0502040204020203" pitchFamily="34" charset="-122"/>
                 <a:ea typeface="Microsoft YaHei UI Light" panose="020B0502040204020203" pitchFamily="34" charset="-122"/>
               </a:rPr>
-              <a:t>Lastname: User1Lastname</a:t>
-            </a:r>
+              <a:t>Lastname: </a:t>
+            </a:r>
+            <a:r>
+              <a:rPr lang="en-US" dirty="0" err="1">
+                <a:latin typeface="Microsoft YaHei UI Light" panose="020B0502040204020203" pitchFamily="34" charset="-122"/>
+                <a:ea typeface="Microsoft YaHei UI Light" panose="020B0502040204020203" pitchFamily="34" charset="-122"/>
+              </a:rPr>
+              <a:t>Sey</a:t>
+            </a:r>
+            <a:endParaRPr lang="en-US" dirty="0">
+              <a:latin typeface="Microsoft YaHei UI Light" panose="020B0502040204020203" pitchFamily="34" charset="-122"/>
+              <a:ea typeface="Microsoft YaHei UI Light" panose="020B0502040204020203" pitchFamily="34" charset="-122"/>
+            </a:endParaRPr>
           </a:p>
           <a:p>
             <a:pPr>
@@ -11476,7 +11011,7 @@
                 <a:latin typeface="Microsoft YaHei UI Light" panose="020B0502040204020203" pitchFamily="34" charset="-122"/>
                 <a:ea typeface="Microsoft YaHei UI Light" panose="020B0502040204020203" pitchFamily="34" charset="-122"/>
               </a:rPr>
-              <a:t>Password: User1Password</a:t>
+              <a:t>Password: !Micheal5</a:t>
             </a:r>
           </a:p>
           <a:p>
@@ -11492,20 +11027,8 @@
                 <a:latin typeface="Microsoft YaHei UI Light" panose="020B0502040204020203" pitchFamily="34" charset="-122"/>
                 <a:ea typeface="Microsoft YaHei UI Light" panose="020B0502040204020203" pitchFamily="34" charset="-122"/>
               </a:rPr>
-              <a:t>Email: </a:t>
-            </a:r>
-            <a:r>
-              <a:rPr lang="en-US" dirty="0">
-                <a:latin typeface="Microsoft YaHei UI Light" panose="020B0502040204020203" pitchFamily="34" charset="-122"/>
-                <a:ea typeface="Microsoft YaHei UI Light" panose="020B0502040204020203" pitchFamily="34" charset="-122"/>
-                <a:hlinkClick r:id="rId2"/>
-              </a:rPr>
-              <a:t>seymicheal007@gmail.com</a:t>
-            </a:r>
-            <a:endParaRPr lang="en-US" dirty="0">
-              <a:latin typeface="Microsoft YaHei UI Light" panose="020B0502040204020203" pitchFamily="34" charset="-122"/>
-              <a:ea typeface="Microsoft YaHei UI Light" panose="020B0502040204020203" pitchFamily="34" charset="-122"/>
-            </a:endParaRPr>
+              <a:t>Email: eolatunde@highstep.com </a:t>
+            </a:r>
           </a:p>
           <a:p>
             <a:pPr>
@@ -11529,7 +11052,7 @@
                 </a:solidFill>
                 <a:effectLst/>
                 <a:latin typeface="Open Sans"/>
-                <a:hlinkClick r:id="rId3"/>
+                <a:hlinkClick r:id="rId2"/>
               </a:rPr>
               <a:t>http://localhost:8080/auth/realms/Realm1/account</a:t>
             </a:r>
@@ -11916,7 +11439,7 @@
     </p:spTree>
     <p:extLst>
       <p:ext uri="{BB962C8B-B14F-4D97-AF65-F5344CB8AC3E}">
-        <p14:creationId xmlns:p14="http://schemas.microsoft.com/office/powerpoint/2010/main" val="1160543701"/>
+        <p14:creationId xmlns:p14="http://schemas.microsoft.com/office/powerpoint/2010/main" val="2943696224"/>
       </p:ext>
     </p:extLst>
   </p:cSld>
@@ -11965,8 +11488,12 @@
           <a:lstStyle/>
           <a:p>
             <a:r>
+              <a:rPr lang="en-US" dirty="0" err="1"/>
+              <a:t>DownlOAD</a:t>
+            </a:r>
+            <a:r>
               <a:rPr lang="en-US" dirty="0"/>
-              <a:t>Realm Creation</a:t>
+              <a:t> WILDFLY </a:t>
             </a:r>
           </a:p>
         </p:txBody>
@@ -11995,7 +11522,7 @@
         </p:spPr>
         <p:txBody>
           <a:bodyPr>
-            <a:normAutofit fontScale="92500" lnSpcReduction="20000"/>
+            <a:normAutofit/>
           </a:bodyPr>
           <a:lstStyle/>
           <a:p>
@@ -12007,19 +11534,7 @@
                 <a:latin typeface="Microsoft YaHei UI Light" panose="020B0502040204020203" pitchFamily="34" charset="-122"/>
                 <a:ea typeface="Microsoft YaHei UI Light" panose="020B0502040204020203" pitchFamily="34" charset="-122"/>
               </a:rPr>
-              <a:t>Name: Realm1</a:t>
-            </a:r>
-          </a:p>
-          <a:p>
-            <a:pPr marL="0" indent="0">
-              <a:buNone/>
-            </a:pPr>
-            <a:r>
-              <a:rPr lang="en-US" dirty="0">
-                <a:latin typeface="Microsoft YaHei UI Light" panose="020B0502040204020203" pitchFamily="34" charset="-122"/>
-                <a:ea typeface="Microsoft YaHei UI Light" panose="020B0502040204020203" pitchFamily="34" charset="-122"/>
-              </a:rPr>
-              <a:t>User(s): </a:t>
+              <a:t>Version: 23.0.0.Beta1 (https://www.keycloak.org/downloads.html)</a:t>
             </a:r>
           </a:p>
           <a:p>
@@ -12035,7 +11550,7 @@
                 <a:latin typeface="Microsoft YaHei UI Light" panose="020B0502040204020203" pitchFamily="34" charset="-122"/>
                 <a:ea typeface="Microsoft YaHei UI Light" panose="020B0502040204020203" pitchFamily="34" charset="-122"/>
               </a:rPr>
-              <a:t>Username: User1</a:t>
+              <a:t>Go to kycloak-12.0.4 and navigate to run below:</a:t>
             </a:r>
           </a:p>
           <a:p>
@@ -12051,14 +11566,58 @@
                 <a:latin typeface="Microsoft YaHei UI Light" panose="020B0502040204020203" pitchFamily="34" charset="-122"/>
                 <a:ea typeface="Microsoft YaHei UI Light" panose="020B0502040204020203" pitchFamily="34" charset="-122"/>
               </a:rPr>
-              <a:t>Firstname: </a:t>
-            </a:r>
-            <a:r>
-              <a:rPr lang="en-US" dirty="0" err="1">
-                <a:latin typeface="Microsoft YaHei UI Light" panose="020B0502040204020203" pitchFamily="34" charset="-122"/>
-                <a:ea typeface="Microsoft YaHei UI Light" panose="020B0502040204020203" pitchFamily="34" charset="-122"/>
-              </a:rPr>
-              <a:t>Micheal</a:t>
+              <a:t>Run </a:t>
+            </a:r>
+            <a:r>
+              <a:rPr kumimoji="0" lang="en-US" altLang="en-US" sz="1600" b="0" i="0" u="none" strike="noStrike" cap="none" normalizeH="0" baseline="0" dirty="0">
+                <a:ln>
+                  <a:noFill/>
+                </a:ln>
+                <a:solidFill>
+                  <a:schemeClr val="tx1"/>
+                </a:solidFill>
+                <a:effectLst/>
+                <a:latin typeface="Droid Sans Mono"/>
+              </a:rPr>
+              <a:t>\bin\standalone.bat -</a:t>
+            </a:r>
+            <a:r>
+              <a:rPr kumimoji="0" lang="en-US" altLang="en-US" sz="1600" b="0" i="0" u="none" strike="noStrike" cap="none" normalizeH="0" baseline="0" dirty="0" err="1">
+                <a:ln>
+                  <a:noFill/>
+                </a:ln>
+                <a:solidFill>
+                  <a:schemeClr val="tx1"/>
+                </a:solidFill>
+                <a:effectLst/>
+                <a:latin typeface="Droid Sans Mono"/>
+              </a:rPr>
+              <a:t>Djboss.socket.binding.port</a:t>
+            </a:r>
+            <a:r>
+              <a:rPr kumimoji="0" lang="en-US" altLang="en-US" sz="1600" b="0" i="0" u="none" strike="noStrike" cap="none" normalizeH="0" baseline="0" dirty="0">
+                <a:ln>
+                  <a:noFill/>
+                </a:ln>
+                <a:solidFill>
+                  <a:schemeClr val="tx1"/>
+                </a:solidFill>
+                <a:effectLst/>
+                <a:latin typeface="Droid Sans Mono"/>
+              </a:rPr>
+              <a:t>-offset=100</a:t>
+            </a:r>
+            <a:r>
+              <a:rPr kumimoji="0" lang="en-US" altLang="en-US" sz="1200" b="0" i="0" u="none" strike="noStrike" cap="none" normalizeH="0" baseline="0" dirty="0">
+                <a:ln>
+                  <a:noFill/>
+                </a:ln>
+                <a:solidFill>
+                  <a:schemeClr val="tx1"/>
+                </a:solidFill>
+                <a:effectLst/>
+              </a:rPr>
+              <a:t> </a:t>
             </a:r>
             <a:endParaRPr lang="en-US" dirty="0">
               <a:latin typeface="Microsoft YaHei UI Light" panose="020B0502040204020203" pitchFamily="34" charset="-122"/>
@@ -12074,22 +11633,22 @@
               <a:buChar char="•"/>
             </a:pPr>
             <a:r>
-              <a:rPr lang="en-US" dirty="0">
-                <a:latin typeface="Microsoft YaHei UI Light" panose="020B0502040204020203" pitchFamily="34" charset="-122"/>
-                <a:ea typeface="Microsoft YaHei UI Light" panose="020B0502040204020203" pitchFamily="34" charset="-122"/>
-              </a:rPr>
-              <a:t>Lastname: </a:t>
-            </a:r>
-            <a:r>
-              <a:rPr lang="en-US" dirty="0" err="1">
-                <a:latin typeface="Microsoft YaHei UI Light" panose="020B0502040204020203" pitchFamily="34" charset="-122"/>
-                <a:ea typeface="Microsoft YaHei UI Light" panose="020B0502040204020203" pitchFamily="34" charset="-122"/>
-              </a:rPr>
-              <a:t>Sey</a:t>
-            </a:r>
-            <a:endParaRPr lang="en-US" dirty="0">
-              <a:latin typeface="Microsoft YaHei UI Light" panose="020B0502040204020203" pitchFamily="34" charset="-122"/>
-              <a:ea typeface="Microsoft YaHei UI Light" panose="020B0502040204020203" pitchFamily="34" charset="-122"/>
+              <a:rPr lang="en-US" b="0" i="0" u="none" strike="noStrike" dirty="0">
+                <a:solidFill>
+                  <a:srgbClr val="004670"/>
+                </a:solidFill>
+                <a:effectLst/>
+                <a:latin typeface="Open Sans"/>
+                <a:hlinkClick r:id="rId2"/>
+              </a:rPr>
+              <a:t>http://localhost:8180/auth/admin/</a:t>
+            </a:r>
+            <a:endParaRPr lang="en-US" b="0" i="0" u="none" strike="noStrike" dirty="0">
+              <a:solidFill>
+                <a:srgbClr val="004670"/>
+              </a:solidFill>
+              <a:effectLst/>
+              <a:latin typeface="Open Sans"/>
             </a:endParaRPr>
           </a:p>
           <a:p>
@@ -12102,11 +11661,20 @@
             </a:pPr>
             <a:r>
               <a:rPr lang="en-US" dirty="0">
-                <a:latin typeface="Microsoft YaHei UI Light" panose="020B0502040204020203" pitchFamily="34" charset="-122"/>
-                <a:ea typeface="Microsoft YaHei UI Light" panose="020B0502040204020203" pitchFamily="34" charset="-122"/>
-              </a:rPr>
-              <a:t>Password: !Micheal5</a:t>
-            </a:r>
+                <a:solidFill>
+                  <a:srgbClr val="004670"/>
+                </a:solidFill>
+                <a:latin typeface="Open Sans"/>
+              </a:rPr>
+              <a:t>Login</a:t>
+            </a:r>
+            <a:endParaRPr lang="en-US" b="0" i="0" u="none" strike="noStrike" dirty="0">
+              <a:solidFill>
+                <a:srgbClr val="004670"/>
+              </a:solidFill>
+              <a:effectLst/>
+              <a:latin typeface="Open Sans"/>
+            </a:endParaRPr>
           </a:p>
           <a:p>
             <a:pPr>
@@ -12115,49 +11683,6 @@
               </a:buClr>
               <a:buFont typeface="Arial" panose="020B0604020202020204" pitchFamily="34" charset="0"/>
               <a:buChar char="•"/>
-            </a:pPr>
-            <a:r>
-              <a:rPr lang="en-US" dirty="0">
-                <a:latin typeface="Microsoft YaHei UI Light" panose="020B0502040204020203" pitchFamily="34" charset="-122"/>
-                <a:ea typeface="Microsoft YaHei UI Light" panose="020B0502040204020203" pitchFamily="34" charset="-122"/>
-              </a:rPr>
-              <a:t>Email: eolatunde@highstep.com </a:t>
-            </a:r>
-          </a:p>
-          <a:p>
-            <a:pPr>
-              <a:buClr>
-                <a:schemeClr val="tx1"/>
-              </a:buClr>
-              <a:buFont typeface="Arial" panose="020B0604020202020204" pitchFamily="34" charset="0"/>
-              <a:buChar char="•"/>
-            </a:pPr>
-            <a:r>
-              <a:rPr lang="en-US" dirty="0">
-                <a:latin typeface="Microsoft YaHei UI Light" panose="020B0502040204020203" pitchFamily="34" charset="-122"/>
-                <a:ea typeface="Microsoft YaHei UI Light" panose="020B0502040204020203" pitchFamily="34" charset="-122"/>
-              </a:rPr>
-              <a:t>Sign in: </a:t>
-            </a:r>
-            <a:r>
-              <a:rPr lang="en-US" b="0" i="0" u="none" strike="noStrike" dirty="0">
-                <a:solidFill>
-                  <a:srgbClr val="004670"/>
-                </a:solidFill>
-                <a:effectLst/>
-                <a:latin typeface="Open Sans"/>
-                <a:hlinkClick r:id="rId2"/>
-              </a:rPr>
-              <a:t>http://localhost:8080/auth/realms/Realm1/account</a:t>
-            </a:r>
-            <a:endParaRPr lang="en-US" dirty="0">
-              <a:latin typeface="Microsoft YaHei UI Light" panose="020B0502040204020203" pitchFamily="34" charset="-122"/>
-              <a:ea typeface="Microsoft YaHei UI Light" panose="020B0502040204020203" pitchFamily="34" charset="-122"/>
-            </a:endParaRPr>
-          </a:p>
-          <a:p>
-            <a:pPr marL="0" indent="0">
-              <a:buNone/>
             </a:pPr>
             <a:endParaRPr lang="en-US" dirty="0">
               <a:latin typeface="Microsoft YaHei UI Light" panose="020B0502040204020203" pitchFamily="34" charset="-122"/>
@@ -12533,7 +12058,7 @@
     </p:spTree>
     <p:extLst>
       <p:ext uri="{BB962C8B-B14F-4D97-AF65-F5344CB8AC3E}">
-        <p14:creationId xmlns:p14="http://schemas.microsoft.com/office/powerpoint/2010/main" val="2943696224"/>
+        <p14:creationId xmlns:p14="http://schemas.microsoft.com/office/powerpoint/2010/main" val="2502167933"/>
       </p:ext>
     </p:extLst>
   </p:cSld>
@@ -12576,7 +12101,12 @@
             <p:ph type="body" idx="1"/>
           </p:nvPr>
         </p:nvSpPr>
-        <p:spPr/>
+        <p:spPr>
+          <a:xfrm>
+            <a:off x="1097280" y="1888255"/>
+            <a:ext cx="4639736" cy="736282"/>
+          </a:xfrm>
+        </p:spPr>
         <p:txBody>
           <a:bodyPr/>
           <a:lstStyle/>
@@ -12587,7 +12117,7 @@
             </a:r>
             <a:r>
               <a:rPr lang="en-US" dirty="0"/>
-              <a:t> WILDFLY </a:t>
+              <a:t> WILDFLY OpenID CONNECT CLIENT ADAPTER</a:t>
             </a:r>
           </a:p>
         </p:txBody>
@@ -12628,7 +12158,7 @@
                 <a:latin typeface="Microsoft YaHei UI Light" panose="020B0502040204020203" pitchFamily="34" charset="-122"/>
                 <a:ea typeface="Microsoft YaHei UI Light" panose="020B0502040204020203" pitchFamily="34" charset="-122"/>
               </a:rPr>
-              <a:t>Version: 23.0.0.Beta1 (https://www.keycloak.org/downloads.html)</a:t>
+              <a:t>Version: 12.0.4 (https://www.keycloak.org/downloads.html)</a:t>
             </a:r>
           </a:p>
           <a:p>
@@ -12644,7 +12174,7 @@
                 <a:latin typeface="Microsoft YaHei UI Light" panose="020B0502040204020203" pitchFamily="34" charset="-122"/>
                 <a:ea typeface="Microsoft YaHei UI Light" panose="020B0502040204020203" pitchFamily="34" charset="-122"/>
               </a:rPr>
-              <a:t>Go to kycloak-12.0.4 and navigate to run below:</a:t>
+              <a:t>Go to wildfly-23.0.0.Beta1 folder and unzip file there</a:t>
             </a:r>
           </a:p>
           <a:p>
@@ -12660,8 +12190,17 @@
                 <a:latin typeface="Microsoft YaHei UI Light" panose="020B0502040204020203" pitchFamily="34" charset="-122"/>
                 <a:ea typeface="Microsoft YaHei UI Light" panose="020B0502040204020203" pitchFamily="34" charset="-122"/>
               </a:rPr>
-              <a:t>Run </a:t>
-            </a:r>
+              <a:t>Open bin directory and run:</a:t>
+            </a:r>
+          </a:p>
+          <a:p>
+            <a:pPr>
+              <a:buClr>
+                <a:schemeClr val="tx1"/>
+              </a:buClr>
+              <a:buFont typeface="Arial" panose="020B0604020202020204" pitchFamily="34" charset="0"/>
+              <a:buChar char="•"/>
+            </a:pPr>
             <a:r>
               <a:rPr kumimoji="0" lang="en-US" altLang="en-US" sz="1600" b="0" i="0" u="none" strike="noStrike" cap="none" normalizeH="0" baseline="0" dirty="0">
                 <a:ln>
@@ -12673,7 +12212,7 @@
                 <a:effectLst/>
                 <a:latin typeface="Droid Sans Mono"/>
               </a:rPr>
-              <a:t>\bin\standalone.bat -</a:t>
+              <a:t>&gt;jboss-cli.bat --file=adapter-install-</a:t>
             </a:r>
             <a:r>
               <a:rPr kumimoji="0" lang="en-US" altLang="en-US" sz="1600" b="0" i="0" u="none" strike="noStrike" cap="none" normalizeH="0" baseline="0" dirty="0" err="1">
@@ -12686,20 +12225,7 @@
                 <a:effectLst/>
                 <a:latin typeface="Droid Sans Mono"/>
               </a:rPr>
-              <a:t>Djboss.socket.binding.port</a:t>
-            </a:r>
-            <a:r>
-              <a:rPr kumimoji="0" lang="en-US" altLang="en-US" sz="1600" b="0" i="0" u="none" strike="noStrike" cap="none" normalizeH="0" baseline="0" dirty="0">
-                <a:ln>
-                  <a:noFill/>
-                </a:ln>
-                <a:solidFill>
-                  <a:schemeClr val="tx1"/>
-                </a:solidFill>
-                <a:effectLst/>
-                <a:latin typeface="Droid Sans Mono"/>
-              </a:rPr>
-              <a:t>-offset=100</a:t>
+              <a:t>offline.cli</a:t>
             </a:r>
             <a:r>
               <a:rPr kumimoji="0" lang="en-US" altLang="en-US" sz="1200" b="0" i="0" u="none" strike="noStrike" cap="none" normalizeH="0" baseline="0" dirty="0">
@@ -12733,6 +12259,34 @@
                 </a:solidFill>
                 <a:effectLst/>
                 <a:latin typeface="Open Sans"/>
+              </a:rPr>
+              <a:t>&gt;standalone.bat</a:t>
+            </a:r>
+          </a:p>
+          <a:p>
+            <a:pPr>
+              <a:buClr>
+                <a:schemeClr val="tx1"/>
+              </a:buClr>
+              <a:buFont typeface="Arial" panose="020B0604020202020204" pitchFamily="34" charset="0"/>
+              <a:buChar char="•"/>
+            </a:pPr>
+            <a:r>
+              <a:rPr lang="en-US" dirty="0">
+                <a:solidFill>
+                  <a:srgbClr val="004670"/>
+                </a:solidFill>
+                <a:latin typeface="Open Sans"/>
+              </a:rPr>
+              <a:t>Login: </a:t>
+            </a:r>
+            <a:r>
+              <a:rPr lang="en-US" b="0" i="0" u="none" strike="noStrike" dirty="0">
+                <a:solidFill>
+                  <a:srgbClr val="004670"/>
+                </a:solidFill>
+                <a:effectLst/>
+                <a:latin typeface="Open Sans"/>
                 <a:hlinkClick r:id="rId2"/>
               </a:rPr>
               <a:t>http://localhost:8180/auth/admin/</a:t>
@@ -12753,15 +12307,6 @@
               <a:buFont typeface="Arial" panose="020B0604020202020204" pitchFamily="34" charset="0"/>
               <a:buChar char="•"/>
             </a:pPr>
-            <a:r>
-              <a:rPr lang="en-US" dirty="0">
-                <a:solidFill>
-                  <a:srgbClr val="004670"/>
-                </a:solidFill>
-                <a:latin typeface="Open Sans"/>
-              </a:rPr>
-              <a:t>Login</a:t>
-            </a:r>
             <a:endParaRPr lang="en-US" b="0" i="0" u="none" strike="noStrike" dirty="0">
               <a:solidFill>
                 <a:srgbClr val="004670"/>
@@ -13152,7 +12697,7 @@
     </p:spTree>
     <p:extLst>
       <p:ext uri="{BB962C8B-B14F-4D97-AF65-F5344CB8AC3E}">
-        <p14:creationId xmlns:p14="http://schemas.microsoft.com/office/powerpoint/2010/main" val="2502167933"/>
+        <p14:creationId xmlns:p14="http://schemas.microsoft.com/office/powerpoint/2010/main" val="1602588266"/>
       </p:ext>
     </p:extLst>
   </p:cSld>
@@ -13206,12 +12751,8 @@
           <a:lstStyle/>
           <a:p>
             <a:r>
-              <a:rPr lang="en-US" dirty="0" err="1"/>
-              <a:t>DownlOAD</a:t>
-            </a:r>
-            <a:r>
               <a:rPr lang="en-US" dirty="0"/>
-              <a:t> WILDFLY OpenID CONNECT CLIENT ADAPTER</a:t>
+              <a:t>Create clients</a:t>
             </a:r>
           </a:p>
         </p:txBody>
@@ -13244,18 +12785,6 @@
           </a:bodyPr>
           <a:lstStyle/>
           <a:p>
-            <a:pPr marL="0" indent="0">
-              <a:buNone/>
-            </a:pPr>
-            <a:r>
-              <a:rPr lang="en-US" dirty="0">
-                <a:latin typeface="Microsoft YaHei UI Light" panose="020B0502040204020203" pitchFamily="34" charset="-122"/>
-                <a:ea typeface="Microsoft YaHei UI Light" panose="020B0502040204020203" pitchFamily="34" charset="-122"/>
-              </a:rPr>
-              <a:t>Version: 12.0.4 (https://www.keycloak.org/downloads.html)</a:t>
-            </a:r>
-          </a:p>
-          <a:p>
             <a:pPr>
               <a:buClr>
                 <a:schemeClr val="tx1"/>
@@ -13265,10 +12794,9 @@
             </a:pPr>
             <a:r>
               <a:rPr lang="en-US" dirty="0">
-                <a:latin typeface="Microsoft YaHei UI Light" panose="020B0502040204020203" pitchFamily="34" charset="-122"/>
-                <a:ea typeface="Microsoft YaHei UI Light" panose="020B0502040204020203" pitchFamily="34" charset="-122"/>
-              </a:rPr>
-              <a:t>Go to wildfly-23.0.0.Beta1 folder and unzip file there</a:t>
+                <a:latin typeface="Open Sans"/>
+              </a:rPr>
+              <a:t>Client Id: vanilla</a:t>
             </a:r>
           </a:p>
           <a:p>
@@ -13280,11 +12808,31 @@
               <a:buChar char="•"/>
             </a:pPr>
             <a:r>
+              <a:rPr lang="en-US" b="0" i="0" u="none" strike="noStrike" dirty="0">
+                <a:effectLst/>
+                <a:latin typeface="Open Sans"/>
+              </a:rPr>
+              <a:t>Client Protocol: </a:t>
+            </a:r>
+            <a:r>
+              <a:rPr lang="en-US" b="0" i="0" u="none" strike="noStrike" dirty="0" err="1">
+                <a:effectLst/>
+                <a:latin typeface="Open Sans"/>
+              </a:rPr>
+              <a:t>openid</a:t>
+            </a:r>
+            <a:r>
+              <a:rPr lang="en-US" b="0" i="0" u="none" strike="noStrike" dirty="0">
+                <a:effectLst/>
+                <a:latin typeface="Open Sans"/>
+              </a:rPr>
+              <a:t>-co</a:t>
+            </a:r>
+            <a:r>
               <a:rPr lang="en-US" dirty="0">
-                <a:latin typeface="Microsoft YaHei UI Light" panose="020B0502040204020203" pitchFamily="34" charset="-122"/>
-                <a:ea typeface="Microsoft YaHei UI Light" panose="020B0502040204020203" pitchFamily="34" charset="-122"/>
-              </a:rPr>
-              <a:t>Open bin directory and run:</a:t>
+                <a:latin typeface="Open Sans"/>
+              </a:rPr>
+              <a:t>nnect</a:t>
             </a:r>
           </a:p>
           <a:p>
@@ -13296,46 +12844,23 @@
               <a:buChar char="•"/>
             </a:pPr>
             <a:r>
-              <a:rPr kumimoji="0" lang="en-US" altLang="en-US" sz="1600" b="0" i="0" u="none" strike="noStrike" cap="none" normalizeH="0" baseline="0" dirty="0">
-                <a:ln>
-                  <a:noFill/>
-                </a:ln>
-                <a:solidFill>
-                  <a:schemeClr val="tx1"/>
-                </a:solidFill>
-                <a:effectLst/>
-                <a:latin typeface="Droid Sans Mono"/>
-              </a:rPr>
-              <a:t>&gt;jboss-cli.bat --file=adapter-install-</a:t>
-            </a:r>
-            <a:r>
-              <a:rPr kumimoji="0" lang="en-US" altLang="en-US" sz="1600" b="0" i="0" u="none" strike="noStrike" cap="none" normalizeH="0" baseline="0" dirty="0" err="1">
-                <a:ln>
-                  <a:noFill/>
-                </a:ln>
-                <a:solidFill>
-                  <a:schemeClr val="tx1"/>
-                </a:solidFill>
-                <a:effectLst/>
-                <a:latin typeface="Droid Sans Mono"/>
-              </a:rPr>
-              <a:t>offline.cli</a:t>
-            </a:r>
-            <a:r>
-              <a:rPr kumimoji="0" lang="en-US" altLang="en-US" sz="1200" b="0" i="0" u="none" strike="noStrike" cap="none" normalizeH="0" baseline="0" dirty="0">
-                <a:ln>
-                  <a:noFill/>
-                </a:ln>
-                <a:solidFill>
-                  <a:schemeClr val="tx1"/>
-                </a:solidFill>
-                <a:effectLst/>
-              </a:rPr>
-              <a:t> </a:t>
-            </a:r>
-            <a:endParaRPr lang="en-US" dirty="0">
-              <a:latin typeface="Microsoft YaHei UI Light" panose="020B0502040204020203" pitchFamily="34" charset="-122"/>
-              <a:ea typeface="Microsoft YaHei UI Light" panose="020B0502040204020203" pitchFamily="34" charset="-122"/>
+              <a:rPr lang="en-US" b="0" i="0" u="none" strike="noStrike" dirty="0">
+                <a:effectLst/>
+                <a:latin typeface="Open Sans"/>
+              </a:rPr>
+              <a:t>Root URL: </a:t>
+            </a:r>
+            <a:r>
+              <a:rPr lang="en-US" b="0" i="0" u="none" strike="noStrike" dirty="0">
+                <a:effectLst/>
+                <a:latin typeface="Open Sans"/>
+                <a:hlinkClick r:id="rId2"/>
+              </a:rPr>
+              <a:t>http://localhost:8080/vanilla</a:t>
+            </a:r>
+            <a:endParaRPr lang="en-US" b="0" i="0" u="none" strike="noStrike" dirty="0">
+              <a:effectLst/>
+              <a:latin typeface="Open Sans"/>
             </a:endParaRPr>
           </a:p>
           <a:p>
@@ -13347,14 +12872,10 @@
               <a:buChar char="•"/>
             </a:pPr>
             <a:r>
-              <a:rPr lang="en-US" b="0" i="0" u="none" strike="noStrike" dirty="0">
-                <a:solidFill>
-                  <a:srgbClr val="004670"/>
-                </a:solidFill>
-                <a:effectLst/>
+              <a:rPr lang="en-US" dirty="0">
                 <a:latin typeface="Open Sans"/>
               </a:rPr>
-              <a:t>&gt;standalone.bat</a:t>
+              <a:t>Save and click on ‘Installation Tab’</a:t>
             </a:r>
           </a:p>
           <a:p>
@@ -13366,32 +12887,30 @@
               <a:buChar char="•"/>
             </a:pPr>
             <a:r>
+              <a:rPr lang="en-US" b="0" i="0" u="none" strike="noStrike" dirty="0">
+                <a:effectLst/>
+                <a:latin typeface="Open Sans"/>
+              </a:rPr>
+              <a:t>Select </a:t>
+            </a:r>
+            <a:r>
               <a:rPr lang="en-US" dirty="0">
-                <a:solidFill>
-                  <a:srgbClr val="004670"/>
-                </a:solidFill>
                 <a:latin typeface="Open Sans"/>
               </a:rPr>
-              <a:t>Login: </a:t>
-            </a:r>
-            <a:r>
-              <a:rPr lang="en-US" b="0" i="0" u="none" strike="noStrike" dirty="0">
-                <a:solidFill>
-                  <a:srgbClr val="004670"/>
-                </a:solidFill>
-                <a:effectLst/>
+              <a:t>‘</a:t>
+            </a:r>
+            <a:r>
+              <a:rPr lang="en-US" dirty="0" err="1">
                 <a:latin typeface="Open Sans"/>
-                <a:hlinkClick r:id="rId2"/>
-              </a:rPr>
-              <a:t>http://localhost:8180/auth/admin/</a:t>
-            </a:r>
-            <a:endParaRPr lang="en-US" b="0" i="0" u="none" strike="noStrike" dirty="0">
-              <a:solidFill>
-                <a:srgbClr val="004670"/>
-              </a:solidFill>
-              <a:effectLst/>
-              <a:latin typeface="Open Sans"/>
-            </a:endParaRPr>
+              </a:rPr>
+              <a:t>Keycloak</a:t>
+            </a:r>
+            <a:r>
+              <a:rPr lang="en-US" dirty="0">
+                <a:latin typeface="Open Sans"/>
+              </a:rPr>
+              <a:t> OIDC JSON’ and download and save to main Directory</a:t>
+            </a:r>
           </a:p>
           <a:p>
             <a:pPr>
@@ -13401,13 +12920,41 @@
               <a:buFont typeface="Arial" panose="020B0604020202020204" pitchFamily="34" charset="0"/>
               <a:buChar char="•"/>
             </a:pPr>
-            <a:endParaRPr lang="en-US" b="0" i="0" u="none" strike="noStrike" dirty="0">
-              <a:solidFill>
-                <a:srgbClr val="004670"/>
-              </a:solidFill>
-              <a:effectLst/>
-              <a:latin typeface="Open Sans"/>
-            </a:endParaRPr>
+            <a:r>
+              <a:rPr lang="en-US" b="0" i="0" u="none" strike="noStrike" dirty="0">
+                <a:effectLst/>
+                <a:latin typeface="Open Sans"/>
+              </a:rPr>
+              <a:t>Repeat last step for ‘</a:t>
+            </a:r>
+            <a:r>
+              <a:rPr lang="en-US" b="0" i="0" u="none" strike="noStrike" dirty="0" err="1">
+                <a:effectLst/>
+                <a:latin typeface="Open Sans"/>
+              </a:rPr>
+              <a:t>Keycloak</a:t>
+            </a:r>
+            <a:r>
+              <a:rPr lang="en-US" b="0" i="0" u="none" strike="noStrike" dirty="0">
+                <a:effectLst/>
+                <a:latin typeface="Open Sans"/>
+              </a:rPr>
+              <a:t> OIDC </a:t>
+            </a:r>
+            <a:r>
+              <a:rPr lang="en-US" b="0" i="0" u="none" strike="noStrike" dirty="0" err="1">
+                <a:effectLst/>
+                <a:latin typeface="Open Sans"/>
+              </a:rPr>
+              <a:t>Jboss</a:t>
+            </a:r>
+            <a:r>
+              <a:rPr lang="en-US" b="0" i="0" u="none" strike="noStrike" dirty="0">
+                <a:effectLst/>
+                <a:latin typeface="Open Sans"/>
+              </a:rPr>
+              <a:t> Subsystem XML’</a:t>
+            </a:r>
           </a:p>
           <a:p>
             <a:pPr>
@@ -13417,6 +12964,19 @@
               <a:buFont typeface="Arial" panose="020B0604020202020204" pitchFamily="34" charset="0"/>
               <a:buChar char="•"/>
             </a:pPr>
+            <a:endParaRPr lang="en-US" b="0" i="0" u="none" strike="noStrike" dirty="0">
+              <a:effectLst/>
+              <a:latin typeface="Open Sans"/>
+            </a:endParaRPr>
+          </a:p>
+          <a:p>
+            <a:pPr>
+              <a:buClr>
+                <a:schemeClr val="tx1"/>
+              </a:buClr>
+              <a:buFont typeface="Arial" panose="020B0604020202020204" pitchFamily="34" charset="0"/>
+              <a:buChar char="•"/>
+            </a:pPr>
             <a:endParaRPr lang="en-US" dirty="0">
               <a:latin typeface="Microsoft YaHei UI Light" panose="020B0502040204020203" pitchFamily="34" charset="-122"/>
               <a:ea typeface="Microsoft YaHei UI Light" panose="020B0502040204020203" pitchFamily="34" charset="-122"/>
@@ -13436,9 +12996,6 @@
               <a:buNone/>
             </a:pPr>
             <a:endParaRPr lang="en-US" dirty="0">
-              <a:solidFill>
-                <a:schemeClr val="tx1"/>
-              </a:solidFill>
               <a:latin typeface="Microsoft YaHei UI Light" panose="020B0502040204020203" pitchFamily="34" charset="-122"/>
               <a:ea typeface="Microsoft YaHei UI Light" panose="020B0502040204020203" pitchFamily="34" charset="-122"/>
             </a:endParaRPr>
@@ -13791,7 +13348,7 @@
     </p:spTree>
     <p:extLst>
       <p:ext uri="{BB962C8B-B14F-4D97-AF65-F5344CB8AC3E}">
-        <p14:creationId xmlns:p14="http://schemas.microsoft.com/office/powerpoint/2010/main" val="1602588266"/>
+        <p14:creationId xmlns:p14="http://schemas.microsoft.com/office/powerpoint/2010/main" val="1732233413"/>
       </p:ext>
     </p:extLst>
   </p:cSld>

</xml_diff>